<commit_message>
Add cycle plot and uterine image to ALPS sampling presentation
</commit_message>
<xml_diff>
--- a/samplingSlideTemplate.pptx
+++ b/samplingSlideTemplate.pptx
@@ -4,9 +4,6 @@
   <p:sldMasterIdLst>
     <p:sldMasterId id="2147483648" r:id="rId1"/>
   </p:sldMasterIdLst>
-  <p:sldIdLst>
-    <p:sldId id="256" r:id="rId2"/>
-  </p:sldIdLst>
   <p:sldSz cx="12192000" cy="6858000"/>
   <p:notesSz cx="6858000" cy="9144000"/>
   <p:defaultTextStyle>
@@ -104,6 +101,11 @@
       </a:defRPr>
     </a:lvl9pPr>
   </p:defaultTextStyle>
+  <p:extLst>
+    <p:ext uri="{EFAFB233-063F-42B5-8137-9DF3F51BA10A}">
+      <p15:sldGuideLst xmlns:p15="http://schemas.microsoft.com/office/powerpoint/2012/main"/>
+    </p:ext>
+  </p:extLst>
 </p:presentation>
 </file>
 
@@ -254,7 +256,7 @@
           <a:p>
             <a:fld id="{98D87B00-D02C-3C43-8451-528C95176F95}" type="datetimeFigureOut">
               <a:rPr lang="en-US" smtClean="0"/>
-              <a:t>8/22/21</a:t>
+              <a:t>8/27/21</a:t>
             </a:fld>
             <a:endParaRPr lang="en-US"/>
           </a:p>
@@ -328,6 +330,317 @@
 </file>
 
 <file path=ppt/slideLayouts/slideLayout10.xml><?xml version="1.0" encoding="utf-8"?>
+<p:sldLayout xmlns:a="http://schemas.openxmlformats.org/drawingml/2006/main" xmlns:r="http://schemas.openxmlformats.org/officeDocument/2006/relationships" xmlns:p="http://schemas.openxmlformats.org/presentationml/2006/main" type="objTx" preserve="1">
+  <p:cSld name="Content with Caption">
+    <p:spTree>
+      <p:nvGrpSpPr>
+        <p:cNvPr id="1" name=""/>
+        <p:cNvGrpSpPr/>
+        <p:nvPr/>
+      </p:nvGrpSpPr>
+      <p:grpSpPr>
+        <a:xfrm>
+          <a:off x="0" y="0"/>
+          <a:ext cx="0" cy="0"/>
+          <a:chOff x="0" y="0"/>
+          <a:chExt cx="0" cy="0"/>
+        </a:xfrm>
+      </p:grpSpPr>
+      <p:sp>
+        <p:nvSpPr>
+          <p:cNvPr id="2" name="Title 1">
+            <a:extLst>
+              <a:ext uri="{FF2B5EF4-FFF2-40B4-BE49-F238E27FC236}">
+                <a16:creationId xmlns:a16="http://schemas.microsoft.com/office/drawing/2014/main" id="{91C7DAE7-DEC0-3047-8B00-7B77109702CE}"/>
+              </a:ext>
+            </a:extLst>
+          </p:cNvPr>
+          <p:cNvSpPr>
+            <a:spLocks noGrp="1"/>
+          </p:cNvSpPr>
+          <p:nvPr>
+            <p:ph type="title"/>
+          </p:nvPr>
+        </p:nvSpPr>
+        <p:spPr>
+          <a:xfrm>
+            <a:off x="839788" y="457200"/>
+            <a:ext cx="3932237" cy="1600200"/>
+          </a:xfrm>
+        </p:spPr>
+        <p:txBody>
+          <a:bodyPr anchor="b"/>
+          <a:lstStyle>
+            <a:lvl1pPr>
+              <a:defRPr sz="3200"/>
+            </a:lvl1pPr>
+          </a:lstStyle>
+          <a:p>
+            <a:r>
+              <a:rPr lang="en-US"/>
+              <a:t>Click to edit Master title style</a:t>
+            </a:r>
+          </a:p>
+        </p:txBody>
+      </p:sp>
+      <p:sp>
+        <p:nvSpPr>
+          <p:cNvPr id="3" name="Content Placeholder 2">
+            <a:extLst>
+              <a:ext uri="{FF2B5EF4-FFF2-40B4-BE49-F238E27FC236}">
+                <a16:creationId xmlns:a16="http://schemas.microsoft.com/office/drawing/2014/main" id="{7CF8AE0F-F1FE-5A4A-9225-48E9AE12C2D6}"/>
+              </a:ext>
+            </a:extLst>
+          </p:cNvPr>
+          <p:cNvSpPr>
+            <a:spLocks noGrp="1"/>
+          </p:cNvSpPr>
+          <p:nvPr>
+            <p:ph idx="1"/>
+          </p:nvPr>
+        </p:nvSpPr>
+        <p:spPr>
+          <a:xfrm>
+            <a:off x="5183188" y="987425"/>
+            <a:ext cx="6172200" cy="4873625"/>
+          </a:xfrm>
+        </p:spPr>
+        <p:txBody>
+          <a:bodyPr/>
+          <a:lstStyle>
+            <a:lvl1pPr>
+              <a:defRPr sz="3200"/>
+            </a:lvl1pPr>
+            <a:lvl2pPr>
+              <a:defRPr sz="2800"/>
+            </a:lvl2pPr>
+            <a:lvl3pPr>
+              <a:defRPr sz="2400"/>
+            </a:lvl3pPr>
+            <a:lvl4pPr>
+              <a:defRPr sz="2000"/>
+            </a:lvl4pPr>
+            <a:lvl5pPr>
+              <a:defRPr sz="2000"/>
+            </a:lvl5pPr>
+            <a:lvl6pPr>
+              <a:defRPr sz="2000"/>
+            </a:lvl6pPr>
+            <a:lvl7pPr>
+              <a:defRPr sz="2000"/>
+            </a:lvl7pPr>
+            <a:lvl8pPr>
+              <a:defRPr sz="2000"/>
+            </a:lvl8pPr>
+            <a:lvl9pPr>
+              <a:defRPr sz="2000"/>
+            </a:lvl9pPr>
+          </a:lstStyle>
+          <a:p>
+            <a:pPr lvl="0"/>
+            <a:r>
+              <a:rPr lang="en-US"/>
+              <a:t>Click to edit Master text styles</a:t>
+            </a:r>
+          </a:p>
+          <a:p>
+            <a:pPr lvl="1"/>
+            <a:r>
+              <a:rPr lang="en-US"/>
+              <a:t>Second level</a:t>
+            </a:r>
+          </a:p>
+          <a:p>
+            <a:pPr lvl="2"/>
+            <a:r>
+              <a:rPr lang="en-US"/>
+              <a:t>Third level</a:t>
+            </a:r>
+          </a:p>
+          <a:p>
+            <a:pPr lvl="3"/>
+            <a:r>
+              <a:rPr lang="en-US"/>
+              <a:t>Fourth level</a:t>
+            </a:r>
+          </a:p>
+          <a:p>
+            <a:pPr lvl="4"/>
+            <a:r>
+              <a:rPr lang="en-US"/>
+              <a:t>Fifth level</a:t>
+            </a:r>
+          </a:p>
+        </p:txBody>
+      </p:sp>
+      <p:sp>
+        <p:nvSpPr>
+          <p:cNvPr id="4" name="Text Placeholder 3">
+            <a:extLst>
+              <a:ext uri="{FF2B5EF4-FFF2-40B4-BE49-F238E27FC236}">
+                <a16:creationId xmlns:a16="http://schemas.microsoft.com/office/drawing/2014/main" id="{0C891B01-0E48-4345-B722-450DB55BA01E}"/>
+              </a:ext>
+            </a:extLst>
+          </p:cNvPr>
+          <p:cNvSpPr>
+            <a:spLocks noGrp="1"/>
+          </p:cNvSpPr>
+          <p:nvPr>
+            <p:ph type="body" sz="half" idx="2"/>
+          </p:nvPr>
+        </p:nvSpPr>
+        <p:spPr>
+          <a:xfrm>
+            <a:off x="839788" y="2057400"/>
+            <a:ext cx="3932237" cy="3811588"/>
+          </a:xfrm>
+        </p:spPr>
+        <p:txBody>
+          <a:bodyPr/>
+          <a:lstStyle>
+            <a:lvl1pPr marL="0" indent="0">
+              <a:buNone/>
+              <a:defRPr sz="1600"/>
+            </a:lvl1pPr>
+            <a:lvl2pPr marL="457200" indent="0">
+              <a:buNone/>
+              <a:defRPr sz="1400"/>
+            </a:lvl2pPr>
+            <a:lvl3pPr marL="914400" indent="0">
+              <a:buNone/>
+              <a:defRPr sz="1200"/>
+            </a:lvl3pPr>
+            <a:lvl4pPr marL="1371600" indent="0">
+              <a:buNone/>
+              <a:defRPr sz="1000"/>
+            </a:lvl4pPr>
+            <a:lvl5pPr marL="1828800" indent="0">
+              <a:buNone/>
+              <a:defRPr sz="1000"/>
+            </a:lvl5pPr>
+            <a:lvl6pPr marL="2286000" indent="0">
+              <a:buNone/>
+              <a:defRPr sz="1000"/>
+            </a:lvl6pPr>
+            <a:lvl7pPr marL="2743200" indent="0">
+              <a:buNone/>
+              <a:defRPr sz="1000"/>
+            </a:lvl7pPr>
+            <a:lvl8pPr marL="3200400" indent="0">
+              <a:buNone/>
+              <a:defRPr sz="1000"/>
+            </a:lvl8pPr>
+            <a:lvl9pPr marL="3657600" indent="0">
+              <a:buNone/>
+              <a:defRPr sz="1000"/>
+            </a:lvl9pPr>
+          </a:lstStyle>
+          <a:p>
+            <a:pPr lvl="0"/>
+            <a:r>
+              <a:rPr lang="en-US"/>
+              <a:t>Click to edit Master text styles</a:t>
+            </a:r>
+          </a:p>
+        </p:txBody>
+      </p:sp>
+      <p:sp>
+        <p:nvSpPr>
+          <p:cNvPr id="5" name="Date Placeholder 4">
+            <a:extLst>
+              <a:ext uri="{FF2B5EF4-FFF2-40B4-BE49-F238E27FC236}">
+                <a16:creationId xmlns:a16="http://schemas.microsoft.com/office/drawing/2014/main" id="{AAD2F25C-EA62-9B48-8583-5BB8F034F071}"/>
+              </a:ext>
+            </a:extLst>
+          </p:cNvPr>
+          <p:cNvSpPr>
+            <a:spLocks noGrp="1"/>
+          </p:cNvSpPr>
+          <p:nvPr>
+            <p:ph type="dt" sz="half" idx="10"/>
+          </p:nvPr>
+        </p:nvSpPr>
+        <p:spPr/>
+        <p:txBody>
+          <a:bodyPr/>
+          <a:lstStyle/>
+          <a:p>
+            <a:fld id="{98D87B00-D02C-3C43-8451-528C95176F95}" type="datetimeFigureOut">
+              <a:rPr lang="en-US" smtClean="0"/>
+              <a:t>8/27/21</a:t>
+            </a:fld>
+            <a:endParaRPr lang="en-US"/>
+          </a:p>
+        </p:txBody>
+      </p:sp>
+      <p:sp>
+        <p:nvSpPr>
+          <p:cNvPr id="6" name="Footer Placeholder 5">
+            <a:extLst>
+              <a:ext uri="{FF2B5EF4-FFF2-40B4-BE49-F238E27FC236}">
+                <a16:creationId xmlns:a16="http://schemas.microsoft.com/office/drawing/2014/main" id="{80D7CE33-C766-0248-BFC0-D781840D468E}"/>
+              </a:ext>
+            </a:extLst>
+          </p:cNvPr>
+          <p:cNvSpPr>
+            <a:spLocks noGrp="1"/>
+          </p:cNvSpPr>
+          <p:nvPr>
+            <p:ph type="ftr" sz="quarter" idx="11"/>
+          </p:nvPr>
+        </p:nvSpPr>
+        <p:spPr/>
+        <p:txBody>
+          <a:bodyPr/>
+          <a:lstStyle/>
+          <a:p>
+            <a:endParaRPr lang="en-US"/>
+          </a:p>
+        </p:txBody>
+      </p:sp>
+      <p:sp>
+        <p:nvSpPr>
+          <p:cNvPr id="7" name="Slide Number Placeholder 6">
+            <a:extLst>
+              <a:ext uri="{FF2B5EF4-FFF2-40B4-BE49-F238E27FC236}">
+                <a16:creationId xmlns:a16="http://schemas.microsoft.com/office/drawing/2014/main" id="{54152953-FF8E-5348-8A98-ACF40D33AAB2}"/>
+              </a:ext>
+            </a:extLst>
+          </p:cNvPr>
+          <p:cNvSpPr>
+            <a:spLocks noGrp="1"/>
+          </p:cNvSpPr>
+          <p:nvPr>
+            <p:ph type="sldNum" sz="quarter" idx="12"/>
+          </p:nvPr>
+        </p:nvSpPr>
+        <p:spPr/>
+        <p:txBody>
+          <a:bodyPr/>
+          <a:lstStyle/>
+          <a:p>
+            <a:fld id="{BA44168E-86A5-E643-B889-0D08F43ABB6D}" type="slidenum">
+              <a:rPr lang="en-US" smtClean="0"/>
+              <a:t>‹#›</a:t>
+            </a:fld>
+            <a:endParaRPr lang="en-US"/>
+          </a:p>
+        </p:txBody>
+      </p:sp>
+    </p:spTree>
+    <p:extLst>
+      <p:ext uri="{BB962C8B-B14F-4D97-AF65-F5344CB8AC3E}">
+        <p14:creationId xmlns:p14="http://schemas.microsoft.com/office/powerpoint/2010/main" val="234694950"/>
+      </p:ext>
+    </p:extLst>
+  </p:cSld>
+  <p:clrMapOvr>
+    <a:masterClrMapping/>
+  </p:clrMapOvr>
+</p:sldLayout>
+</file>
+
+<file path=ppt/slideLayouts/slideLayout11.xml><?xml version="1.0" encoding="utf-8"?>
 <p:sldLayout xmlns:a="http://schemas.openxmlformats.org/drawingml/2006/main" xmlns:r="http://schemas.openxmlformats.org/officeDocument/2006/relationships" xmlns:p="http://schemas.openxmlformats.org/presentationml/2006/main" type="picTx" preserve="1">
   <p:cSld name="Picture with Caption">
     <p:spTree>
@@ -542,7 +855,7 @@
           <a:p>
             <a:fld id="{98D87B00-D02C-3C43-8451-528C95176F95}" type="datetimeFigureOut">
               <a:rPr lang="en-US" smtClean="0"/>
-              <a:t>8/22/21</a:t>
+              <a:t>8/27/21</a:t>
             </a:fld>
             <a:endParaRPr lang="en-US"/>
           </a:p>
@@ -615,7 +928,7 @@
 </p:sldLayout>
 </file>
 
-<file path=ppt/slideLayouts/slideLayout11.xml><?xml version="1.0" encoding="utf-8"?>
+<file path=ppt/slideLayouts/slideLayout12.xml><?xml version="1.0" encoding="utf-8"?>
 <p:sldLayout xmlns:a="http://schemas.openxmlformats.org/drawingml/2006/main" xmlns:r="http://schemas.openxmlformats.org/officeDocument/2006/relationships" xmlns:p="http://schemas.openxmlformats.org/presentationml/2006/main" type="vertTx" preserve="1">
   <p:cSld name="Title and Vertical Text">
     <p:spTree>
@@ -740,7 +1053,7 @@
           <a:p>
             <a:fld id="{98D87B00-D02C-3C43-8451-528C95176F95}" type="datetimeFigureOut">
               <a:rPr lang="en-US" smtClean="0"/>
-              <a:t>8/22/21</a:t>
+              <a:t>8/27/21</a:t>
             </a:fld>
             <a:endParaRPr lang="en-US"/>
           </a:p>
@@ -813,7 +1126,7 @@
 </p:sldLayout>
 </file>
 
-<file path=ppt/slideLayouts/slideLayout12.xml><?xml version="1.0" encoding="utf-8"?>
+<file path=ppt/slideLayouts/slideLayout13.xml><?xml version="1.0" encoding="utf-8"?>
 <p:sldLayout xmlns:a="http://schemas.openxmlformats.org/drawingml/2006/main" xmlns:r="http://schemas.openxmlformats.org/officeDocument/2006/relationships" xmlns:p="http://schemas.openxmlformats.org/presentationml/2006/main" type="vertTitleAndTx" preserve="1">
   <p:cSld name="Vertical Title and Text">
     <p:spTree>
@@ -948,7 +1261,7 @@
           <a:p>
             <a:fld id="{98D87B00-D02C-3C43-8451-528C95176F95}" type="datetimeFigureOut">
               <a:rPr lang="en-US" smtClean="0"/>
-              <a:t>8/22/21</a:t>
+              <a:t>8/27/21</a:t>
             </a:fld>
             <a:endParaRPr lang="en-US"/>
           </a:p>
@@ -1676,6 +1989,660 @@
 </file>
 
 <file path=ppt/slideLayouts/slideLayout3.xml><?xml version="1.0" encoding="utf-8"?>
+<p:sldLayout xmlns:a="http://schemas.openxmlformats.org/drawingml/2006/main" xmlns:r="http://schemas.openxmlformats.org/officeDocument/2006/relationships" xmlns:p="http://schemas.openxmlformats.org/presentationml/2006/main" preserve="1" userDrawn="1">
+  <p:cSld name="samplingSlide2">
+    <p:spTree>
+      <p:nvGrpSpPr>
+        <p:cNvPr id="1" name=""/>
+        <p:cNvGrpSpPr/>
+        <p:nvPr/>
+      </p:nvGrpSpPr>
+      <p:grpSpPr>
+        <a:xfrm>
+          <a:off x="0" y="0"/>
+          <a:ext cx="0" cy="0"/>
+          <a:chOff x="0" y="0"/>
+          <a:chExt cx="0" cy="0"/>
+        </a:xfrm>
+      </p:grpSpPr>
+      <p:sp>
+        <p:nvSpPr>
+          <p:cNvPr id="17" name="uterusPic">
+            <a:extLst>
+              <a:ext uri="{FF2B5EF4-FFF2-40B4-BE49-F238E27FC236}">
+                <a16:creationId xmlns:a16="http://schemas.microsoft.com/office/drawing/2014/main" id="{1F84A36F-E68E-F549-BB0A-9C9ACE636BF7}"/>
+              </a:ext>
+            </a:extLst>
+          </p:cNvPr>
+          <p:cNvSpPr>
+            <a:spLocks noGrp="1"/>
+          </p:cNvSpPr>
+          <p:nvPr>
+            <p:ph sz="quarter" idx="23" hasCustomPrompt="1"/>
+          </p:nvPr>
+        </p:nvSpPr>
+        <p:spPr>
+          <a:xfrm>
+            <a:off x="6368396" y="4483184"/>
+            <a:ext cx="5823604" cy="2298060"/>
+          </a:xfrm>
+        </p:spPr>
+        <p:txBody>
+          <a:bodyPr/>
+          <a:lstStyle>
+            <a:lvl1pPr marL="0" indent="0">
+              <a:buNone/>
+              <a:defRPr/>
+            </a:lvl1pPr>
+          </a:lstStyle>
+          <a:p>
+            <a:pPr lvl="0"/>
+            <a:r>
+              <a:rPr lang="en-US" dirty="0"/>
+              <a:t>Uterus</a:t>
+            </a:r>
+          </a:p>
+        </p:txBody>
+      </p:sp>
+      <p:sp>
+        <p:nvSpPr>
+          <p:cNvPr id="16" name="maxLH">
+            <a:extLst>
+              <a:ext uri="{FF2B5EF4-FFF2-40B4-BE49-F238E27FC236}">
+                <a16:creationId xmlns:a16="http://schemas.microsoft.com/office/drawing/2014/main" id="{00A513FC-BAB5-4442-80A9-FB6B5801FFF9}"/>
+              </a:ext>
+            </a:extLst>
+          </p:cNvPr>
+          <p:cNvSpPr>
+            <a:spLocks noGrp="1"/>
+          </p:cNvSpPr>
+          <p:nvPr>
+            <p:ph sz="quarter" idx="22" hasCustomPrompt="1"/>
+          </p:nvPr>
+        </p:nvSpPr>
+        <p:spPr>
+          <a:xfrm>
+            <a:off x="4533470" y="0"/>
+            <a:ext cx="3397456" cy="1325562"/>
+          </a:xfrm>
+        </p:spPr>
+        <p:txBody>
+          <a:bodyPr anchor="ctr">
+            <a:normAutofit/>
+          </a:bodyPr>
+          <a:lstStyle>
+            <a:lvl1pPr marL="0" indent="0" algn="l" defTabSz="914400" rtl="0" eaLnBrk="1" latinLnBrk="0" hangingPunct="1">
+              <a:lnSpc>
+                <a:spcPct val="90000"/>
+              </a:lnSpc>
+              <a:spcBef>
+                <a:spcPct val="0"/>
+              </a:spcBef>
+              <a:buNone/>
+              <a:defRPr lang="en-US" sz="3200" kern="1200" dirty="0">
+                <a:solidFill>
+                  <a:schemeClr val="tx1"/>
+                </a:solidFill>
+                <a:latin typeface="Arial" panose="020B0604020202020204" pitchFamily="34" charset="0"/>
+                <a:ea typeface="+mj-ea"/>
+                <a:cs typeface="Arial" panose="020B0604020202020204" pitchFamily="34" charset="0"/>
+              </a:defRPr>
+            </a:lvl1pPr>
+          </a:lstStyle>
+          <a:p>
+            <a:pPr lvl="0"/>
+            <a:r>
+              <a:rPr lang="en-US" dirty="0"/>
+              <a:t>Max LH:</a:t>
+            </a:r>
+          </a:p>
+        </p:txBody>
+      </p:sp>
+      <p:sp>
+        <p:nvSpPr>
+          <p:cNvPr id="15" name="cyclePlot">
+            <a:extLst>
+              <a:ext uri="{FF2B5EF4-FFF2-40B4-BE49-F238E27FC236}">
+                <a16:creationId xmlns:a16="http://schemas.microsoft.com/office/drawing/2014/main" id="{C473C8D3-71AE-9341-BE9B-BFF30B1490AC}"/>
+              </a:ext>
+            </a:extLst>
+          </p:cNvPr>
+          <p:cNvSpPr>
+            <a:spLocks noGrp="1"/>
+          </p:cNvSpPr>
+          <p:nvPr>
+            <p:ph sz="quarter" idx="21" hasCustomPrompt="1"/>
+          </p:nvPr>
+        </p:nvSpPr>
+        <p:spPr>
+          <a:xfrm>
+            <a:off x="272396" y="4483184"/>
+            <a:ext cx="5823604" cy="2298060"/>
+          </a:xfrm>
+        </p:spPr>
+        <p:txBody>
+          <a:bodyPr/>
+          <a:lstStyle>
+            <a:lvl1pPr marL="0" indent="0">
+              <a:buNone/>
+              <a:defRPr/>
+            </a:lvl1pPr>
+          </a:lstStyle>
+          <a:p>
+            <a:pPr lvl="0"/>
+            <a:r>
+              <a:rPr lang="en-US" dirty="0"/>
+              <a:t>Cycle</a:t>
+            </a:r>
+          </a:p>
+        </p:txBody>
+      </p:sp>
+      <p:sp>
+        <p:nvSpPr>
+          <p:cNvPr id="7" name="2 days before">
+            <a:extLst>
+              <a:ext uri="{FF2B5EF4-FFF2-40B4-BE49-F238E27FC236}">
+                <a16:creationId xmlns:a16="http://schemas.microsoft.com/office/drawing/2014/main" id="{2C3790EE-D439-B948-A520-A3EC787BAACD}"/>
+              </a:ext>
+            </a:extLst>
+          </p:cNvPr>
+          <p:cNvSpPr txBox="1"/>
+          <p:nvPr userDrawn="1"/>
+        </p:nvSpPr>
+        <p:spPr>
+          <a:xfrm>
+            <a:off x="0" y="1495344"/>
+            <a:ext cx="276999" cy="2759074"/>
+          </a:xfrm>
+          <a:prstGeom prst="rect">
+            <a:avLst/>
+          </a:prstGeom>
+          <a:noFill/>
+        </p:spPr>
+        <p:txBody>
+          <a:bodyPr vert="vert270" wrap="square" lIns="0" tIns="0" rIns="0" bIns="0" rtlCol="0">
+            <a:spAutoFit/>
+          </a:bodyPr>
+          <a:lstStyle/>
+          <a:p>
+            <a:pPr algn="ctr"/>
+            <a:r>
+              <a:rPr lang="en-US" dirty="0">
+                <a:latin typeface="Arial" panose="020B0604020202020204" pitchFamily="34" charset="0"/>
+                <a:cs typeface="Arial" panose="020B0604020202020204" pitchFamily="34" charset="0"/>
+              </a:rPr>
+              <a:t>2 days before</a:t>
+            </a:r>
+          </a:p>
+        </p:txBody>
+      </p:sp>
+      <p:sp>
+        <p:nvSpPr>
+          <p:cNvPr id="8" name="previous day">
+            <a:extLst>
+              <a:ext uri="{FF2B5EF4-FFF2-40B4-BE49-F238E27FC236}">
+                <a16:creationId xmlns:a16="http://schemas.microsoft.com/office/drawing/2014/main" id="{627E77C6-4F38-C84D-8019-FAE3364DA784}"/>
+              </a:ext>
+            </a:extLst>
+          </p:cNvPr>
+          <p:cNvSpPr txBox="1"/>
+          <p:nvPr userDrawn="1"/>
+        </p:nvSpPr>
+        <p:spPr>
+          <a:xfrm>
+            <a:off x="4047497" y="1515898"/>
+            <a:ext cx="276999" cy="2717966"/>
+          </a:xfrm>
+          <a:prstGeom prst="rect">
+            <a:avLst/>
+          </a:prstGeom>
+          <a:noFill/>
+        </p:spPr>
+        <p:txBody>
+          <a:bodyPr vert="vert270" wrap="square" lIns="0" tIns="0" rIns="0" bIns="0" rtlCol="0">
+            <a:spAutoFit/>
+          </a:bodyPr>
+          <a:lstStyle/>
+          <a:p>
+            <a:pPr algn="ctr"/>
+            <a:r>
+              <a:rPr lang="en-US" dirty="0">
+                <a:latin typeface="Arial" panose="020B0604020202020204" pitchFamily="34" charset="0"/>
+                <a:cs typeface="Arial" panose="020B0604020202020204" pitchFamily="34" charset="0"/>
+              </a:rPr>
+              <a:t>Previous day</a:t>
+            </a:r>
+          </a:p>
+        </p:txBody>
+      </p:sp>
+      <p:sp>
+        <p:nvSpPr>
+          <p:cNvPr id="9" name="am">
+            <a:extLst>
+              <a:ext uri="{FF2B5EF4-FFF2-40B4-BE49-F238E27FC236}">
+                <a16:creationId xmlns:a16="http://schemas.microsoft.com/office/drawing/2014/main" id="{9F2F03F3-A825-A34C-8C77-8125408D5213}"/>
+              </a:ext>
+            </a:extLst>
+          </p:cNvPr>
+          <p:cNvSpPr txBox="1"/>
+          <p:nvPr userDrawn="1"/>
+        </p:nvSpPr>
+        <p:spPr>
+          <a:xfrm>
+            <a:off x="8139900" y="1515899"/>
+            <a:ext cx="276999" cy="2717965"/>
+          </a:xfrm>
+          <a:prstGeom prst="rect">
+            <a:avLst/>
+          </a:prstGeom>
+          <a:noFill/>
+        </p:spPr>
+        <p:txBody>
+          <a:bodyPr vert="vert270" wrap="square" lIns="0" tIns="0" rIns="0" bIns="0" rtlCol="0">
+            <a:spAutoFit/>
+          </a:bodyPr>
+          <a:lstStyle/>
+          <a:p>
+            <a:pPr algn="ctr"/>
+            <a:r>
+              <a:rPr lang="en-US" dirty="0">
+                <a:latin typeface="Arial" panose="020B0604020202020204" pitchFamily="34" charset="0"/>
+                <a:cs typeface="Arial" panose="020B0604020202020204" pitchFamily="34" charset="0"/>
+              </a:rPr>
+              <a:t>AM</a:t>
+            </a:r>
+          </a:p>
+        </p:txBody>
+      </p:sp>
+      <p:sp>
+        <p:nvSpPr>
+          <p:cNvPr id="12" name="uterineMass">
+            <a:extLst>
+              <a:ext uri="{FF2B5EF4-FFF2-40B4-BE49-F238E27FC236}">
+                <a16:creationId xmlns:a16="http://schemas.microsoft.com/office/drawing/2014/main" id="{84396B10-458B-A44C-B9B1-D3749F4AD347}"/>
+              </a:ext>
+            </a:extLst>
+          </p:cNvPr>
+          <p:cNvSpPr>
+            <a:spLocks noGrp="1"/>
+          </p:cNvSpPr>
+          <p:nvPr>
+            <p:ph sz="quarter" idx="17" hasCustomPrompt="1"/>
+          </p:nvPr>
+        </p:nvSpPr>
+        <p:spPr>
+          <a:xfrm>
+            <a:off x="8457201" y="0"/>
+            <a:ext cx="3397456" cy="1325562"/>
+          </a:xfrm>
+        </p:spPr>
+        <p:txBody>
+          <a:bodyPr anchor="ctr">
+            <a:normAutofit/>
+          </a:bodyPr>
+          <a:lstStyle>
+            <a:lvl1pPr marL="0" indent="0" algn="l" defTabSz="914400" rtl="0" eaLnBrk="1" latinLnBrk="0" hangingPunct="1">
+              <a:lnSpc>
+                <a:spcPct val="90000"/>
+              </a:lnSpc>
+              <a:spcBef>
+                <a:spcPct val="0"/>
+              </a:spcBef>
+              <a:buNone/>
+              <a:defRPr lang="en-US" sz="3200" kern="1200" dirty="0">
+                <a:solidFill>
+                  <a:schemeClr val="tx1"/>
+                </a:solidFill>
+                <a:latin typeface="Arial" panose="020B0604020202020204" pitchFamily="34" charset="0"/>
+                <a:ea typeface="+mj-ea"/>
+                <a:cs typeface="Arial" panose="020B0604020202020204" pitchFamily="34" charset="0"/>
+              </a:defRPr>
+            </a:lvl1pPr>
+          </a:lstStyle>
+          <a:p>
+            <a:pPr lvl="0"/>
+            <a:r>
+              <a:rPr lang="en-US" dirty="0"/>
+              <a:t>Uterine Mass:</a:t>
+            </a:r>
+          </a:p>
+        </p:txBody>
+      </p:sp>
+      <p:sp>
+        <p:nvSpPr>
+          <p:cNvPr id="13" name="imgAnteAyer">
+            <a:extLst>
+              <a:ext uri="{FF2B5EF4-FFF2-40B4-BE49-F238E27FC236}">
+                <a16:creationId xmlns:a16="http://schemas.microsoft.com/office/drawing/2014/main" id="{A8B629B7-FEAE-1C41-96EC-7F08B052C080}"/>
+              </a:ext>
+            </a:extLst>
+          </p:cNvPr>
+          <p:cNvSpPr>
+            <a:spLocks noGrp="1"/>
+          </p:cNvSpPr>
+          <p:nvPr>
+            <p:ph sz="quarter" idx="19"/>
+          </p:nvPr>
+        </p:nvSpPr>
+        <p:spPr>
+          <a:xfrm>
+            <a:off x="272396" y="1380961"/>
+            <a:ext cx="3734799" cy="2987840"/>
+          </a:xfrm>
+        </p:spPr>
+        <p:txBody>
+          <a:bodyPr/>
+          <a:lstStyle>
+            <a:lvl1pPr>
+              <a:defRPr>
+                <a:latin typeface="Arial" panose="020B0604020202020204" pitchFamily="34" charset="0"/>
+                <a:cs typeface="Arial" panose="020B0604020202020204" pitchFamily="34" charset="0"/>
+              </a:defRPr>
+            </a:lvl1pPr>
+            <a:lvl2pPr>
+              <a:defRPr>
+                <a:latin typeface="Arial" panose="020B0604020202020204" pitchFamily="34" charset="0"/>
+                <a:cs typeface="Arial" panose="020B0604020202020204" pitchFamily="34" charset="0"/>
+              </a:defRPr>
+            </a:lvl2pPr>
+            <a:lvl3pPr>
+              <a:defRPr>
+                <a:latin typeface="Arial" panose="020B0604020202020204" pitchFamily="34" charset="0"/>
+                <a:cs typeface="Arial" panose="020B0604020202020204" pitchFamily="34" charset="0"/>
+              </a:defRPr>
+            </a:lvl3pPr>
+            <a:lvl4pPr>
+              <a:defRPr>
+                <a:latin typeface="Arial" panose="020B0604020202020204" pitchFamily="34" charset="0"/>
+                <a:cs typeface="Arial" panose="020B0604020202020204" pitchFamily="34" charset="0"/>
+              </a:defRPr>
+            </a:lvl4pPr>
+            <a:lvl5pPr>
+              <a:defRPr>
+                <a:latin typeface="Arial" panose="020B0604020202020204" pitchFamily="34" charset="0"/>
+                <a:cs typeface="Arial" panose="020B0604020202020204" pitchFamily="34" charset="0"/>
+              </a:defRPr>
+            </a:lvl5pPr>
+          </a:lstStyle>
+          <a:p>
+            <a:pPr lvl="0"/>
+            <a:r>
+              <a:rPr lang="en-US"/>
+              <a:t>Click to edit Master text styles</a:t>
+            </a:r>
+          </a:p>
+          <a:p>
+            <a:pPr lvl="1"/>
+            <a:r>
+              <a:rPr lang="en-US"/>
+              <a:t>Second level</a:t>
+            </a:r>
+          </a:p>
+          <a:p>
+            <a:pPr lvl="2"/>
+            <a:r>
+              <a:rPr lang="en-US"/>
+              <a:t>Third level</a:t>
+            </a:r>
+          </a:p>
+          <a:p>
+            <a:pPr lvl="3"/>
+            <a:r>
+              <a:rPr lang="en-US"/>
+              <a:t>Fourth level</a:t>
+            </a:r>
+          </a:p>
+          <a:p>
+            <a:pPr lvl="4"/>
+            <a:r>
+              <a:rPr lang="en-US"/>
+              <a:t>Fifth level</a:t>
+            </a:r>
+          </a:p>
+        </p:txBody>
+      </p:sp>
+      <p:sp>
+        <p:nvSpPr>
+          <p:cNvPr id="14" name="imgAyer">
+            <a:extLst>
+              <a:ext uri="{FF2B5EF4-FFF2-40B4-BE49-F238E27FC236}">
+                <a16:creationId xmlns:a16="http://schemas.microsoft.com/office/drawing/2014/main" id="{5236435B-ACEE-E244-92F9-C0FF6CCEA205}"/>
+              </a:ext>
+            </a:extLst>
+          </p:cNvPr>
+          <p:cNvSpPr>
+            <a:spLocks noGrp="1"/>
+          </p:cNvSpPr>
+          <p:nvPr>
+            <p:ph sz="quarter" idx="20"/>
+          </p:nvPr>
+        </p:nvSpPr>
+        <p:spPr>
+          <a:xfrm>
+            <a:off x="4364799" y="1380961"/>
+            <a:ext cx="3734799" cy="2987840"/>
+          </a:xfrm>
+        </p:spPr>
+        <p:txBody>
+          <a:bodyPr/>
+          <a:lstStyle>
+            <a:lvl1pPr>
+              <a:defRPr>
+                <a:latin typeface="Arial" panose="020B0604020202020204" pitchFamily="34" charset="0"/>
+                <a:cs typeface="Arial" panose="020B0604020202020204" pitchFamily="34" charset="0"/>
+              </a:defRPr>
+            </a:lvl1pPr>
+            <a:lvl2pPr>
+              <a:defRPr>
+                <a:latin typeface="Arial" panose="020B0604020202020204" pitchFamily="34" charset="0"/>
+                <a:cs typeface="Arial" panose="020B0604020202020204" pitchFamily="34" charset="0"/>
+              </a:defRPr>
+            </a:lvl2pPr>
+            <a:lvl3pPr>
+              <a:defRPr>
+                <a:latin typeface="Arial" panose="020B0604020202020204" pitchFamily="34" charset="0"/>
+                <a:cs typeface="Arial" panose="020B0604020202020204" pitchFamily="34" charset="0"/>
+              </a:defRPr>
+            </a:lvl3pPr>
+            <a:lvl4pPr>
+              <a:defRPr>
+                <a:latin typeface="Arial" panose="020B0604020202020204" pitchFamily="34" charset="0"/>
+                <a:cs typeface="Arial" panose="020B0604020202020204" pitchFamily="34" charset="0"/>
+              </a:defRPr>
+            </a:lvl4pPr>
+            <a:lvl5pPr>
+              <a:defRPr>
+                <a:latin typeface="Arial" panose="020B0604020202020204" pitchFamily="34" charset="0"/>
+                <a:cs typeface="Arial" panose="020B0604020202020204" pitchFamily="34" charset="0"/>
+              </a:defRPr>
+            </a:lvl5pPr>
+          </a:lstStyle>
+          <a:p>
+            <a:pPr lvl="0"/>
+            <a:r>
+              <a:rPr lang="en-US" dirty="0"/>
+              <a:t>Click to edit Master text styles</a:t>
+            </a:r>
+          </a:p>
+          <a:p>
+            <a:pPr lvl="1"/>
+            <a:r>
+              <a:rPr lang="en-US" dirty="0"/>
+              <a:t>Second level</a:t>
+            </a:r>
+          </a:p>
+          <a:p>
+            <a:pPr lvl="2"/>
+            <a:r>
+              <a:rPr lang="en-US" dirty="0"/>
+              <a:t>Third level</a:t>
+            </a:r>
+          </a:p>
+          <a:p>
+            <a:pPr lvl="3"/>
+            <a:r>
+              <a:rPr lang="en-US" dirty="0"/>
+              <a:t>Fourth level</a:t>
+            </a:r>
+          </a:p>
+          <a:p>
+            <a:pPr lvl="4"/>
+            <a:r>
+              <a:rPr lang="en-US" dirty="0"/>
+              <a:t>Fifth level</a:t>
+            </a:r>
+          </a:p>
+        </p:txBody>
+      </p:sp>
+      <p:sp>
+        <p:nvSpPr>
+          <p:cNvPr id="6" name="imgAM">
+            <a:extLst>
+              <a:ext uri="{FF2B5EF4-FFF2-40B4-BE49-F238E27FC236}">
+                <a16:creationId xmlns:a16="http://schemas.microsoft.com/office/drawing/2014/main" id="{249A8A22-DEE3-414B-9655-7EFD81F259C6}"/>
+              </a:ext>
+            </a:extLst>
+          </p:cNvPr>
+          <p:cNvSpPr>
+            <a:spLocks noGrp="1"/>
+          </p:cNvSpPr>
+          <p:nvPr>
+            <p:ph sz="quarter" idx="15"/>
+          </p:nvPr>
+        </p:nvSpPr>
+        <p:spPr>
+          <a:xfrm>
+            <a:off x="8457201" y="1380961"/>
+            <a:ext cx="3734799" cy="2987840"/>
+          </a:xfrm>
+        </p:spPr>
+        <p:txBody>
+          <a:bodyPr/>
+          <a:lstStyle>
+            <a:lvl1pPr>
+              <a:defRPr>
+                <a:latin typeface="Arial" panose="020B0604020202020204" pitchFamily="34" charset="0"/>
+                <a:cs typeface="Arial" panose="020B0604020202020204" pitchFamily="34" charset="0"/>
+              </a:defRPr>
+            </a:lvl1pPr>
+            <a:lvl2pPr>
+              <a:defRPr>
+                <a:latin typeface="Arial" panose="020B0604020202020204" pitchFamily="34" charset="0"/>
+                <a:cs typeface="Arial" panose="020B0604020202020204" pitchFamily="34" charset="0"/>
+              </a:defRPr>
+            </a:lvl2pPr>
+            <a:lvl3pPr>
+              <a:defRPr>
+                <a:latin typeface="Arial" panose="020B0604020202020204" pitchFamily="34" charset="0"/>
+                <a:cs typeface="Arial" panose="020B0604020202020204" pitchFamily="34" charset="0"/>
+              </a:defRPr>
+            </a:lvl3pPr>
+            <a:lvl4pPr>
+              <a:defRPr>
+                <a:latin typeface="Arial" panose="020B0604020202020204" pitchFamily="34" charset="0"/>
+                <a:cs typeface="Arial" panose="020B0604020202020204" pitchFamily="34" charset="0"/>
+              </a:defRPr>
+            </a:lvl4pPr>
+            <a:lvl5pPr>
+              <a:defRPr>
+                <a:latin typeface="Arial" panose="020B0604020202020204" pitchFamily="34" charset="0"/>
+                <a:cs typeface="Arial" panose="020B0604020202020204" pitchFamily="34" charset="0"/>
+              </a:defRPr>
+            </a:lvl5pPr>
+          </a:lstStyle>
+          <a:p>
+            <a:pPr lvl="0"/>
+            <a:r>
+              <a:rPr lang="en-US" dirty="0"/>
+              <a:t>Click to edit Master text styles</a:t>
+            </a:r>
+          </a:p>
+          <a:p>
+            <a:pPr lvl="1"/>
+            <a:r>
+              <a:rPr lang="en-US" dirty="0"/>
+              <a:t>Second level</a:t>
+            </a:r>
+          </a:p>
+          <a:p>
+            <a:pPr lvl="2"/>
+            <a:r>
+              <a:rPr lang="en-US" dirty="0"/>
+              <a:t>Third level</a:t>
+            </a:r>
+          </a:p>
+          <a:p>
+            <a:pPr lvl="3"/>
+            <a:r>
+              <a:rPr lang="en-US" dirty="0"/>
+              <a:t>Fourth level</a:t>
+            </a:r>
+          </a:p>
+          <a:p>
+            <a:pPr lvl="4"/>
+            <a:r>
+              <a:rPr lang="en-US" dirty="0"/>
+              <a:t>Fifth level</a:t>
+            </a:r>
+          </a:p>
+        </p:txBody>
+      </p:sp>
+      <p:sp>
+        <p:nvSpPr>
+          <p:cNvPr id="11" name="mouseID">
+            <a:extLst>
+              <a:ext uri="{FF2B5EF4-FFF2-40B4-BE49-F238E27FC236}">
+                <a16:creationId xmlns:a16="http://schemas.microsoft.com/office/drawing/2014/main" id="{78F4A154-93DD-4E4B-BBFD-C6DF0987866D}"/>
+              </a:ext>
+            </a:extLst>
+          </p:cNvPr>
+          <p:cNvSpPr>
+            <a:spLocks noGrp="1"/>
+          </p:cNvSpPr>
+          <p:nvPr>
+            <p:ph type="title" hasCustomPrompt="1"/>
+          </p:nvPr>
+        </p:nvSpPr>
+        <p:spPr>
+          <a:xfrm>
+            <a:off x="278892" y="0"/>
+            <a:ext cx="4045604" cy="1325563"/>
+          </a:xfrm>
+        </p:spPr>
+        <p:txBody>
+          <a:bodyPr>
+            <a:normAutofit/>
+          </a:bodyPr>
+          <a:lstStyle>
+            <a:lvl1pPr>
+              <a:defRPr sz="3200">
+                <a:latin typeface="Arial" panose="020B0604020202020204" pitchFamily="34" charset="0"/>
+                <a:cs typeface="Arial" panose="020B0604020202020204" pitchFamily="34" charset="0"/>
+              </a:defRPr>
+            </a:lvl1pPr>
+          </a:lstStyle>
+          <a:p>
+            <a:r>
+              <a:rPr lang="en-US" dirty="0"/>
+              <a:t>ID:</a:t>
+            </a:r>
+          </a:p>
+        </p:txBody>
+      </p:sp>
+    </p:spTree>
+    <p:extLst>
+      <p:ext uri="{BB962C8B-B14F-4D97-AF65-F5344CB8AC3E}">
+        <p14:creationId xmlns:p14="http://schemas.microsoft.com/office/powerpoint/2010/main" val="3568937397"/>
+      </p:ext>
+    </p:extLst>
+  </p:cSld>
+  <p:clrMapOvr>
+    <a:masterClrMapping/>
+  </p:clrMapOvr>
+</p:sldLayout>
+</file>
+
+<file path=ppt/slideLayouts/slideLayout4.xml><?xml version="1.0" encoding="utf-8"?>
 <p:sldLayout xmlns:a="http://schemas.openxmlformats.org/drawingml/2006/main" xmlns:r="http://schemas.openxmlformats.org/officeDocument/2006/relationships" xmlns:p="http://schemas.openxmlformats.org/presentationml/2006/main" type="obj" preserve="1">
   <p:cSld name="Title and Content">
     <p:spTree>
@@ -1800,7 +2767,7 @@
           <a:p>
             <a:fld id="{98D87B00-D02C-3C43-8451-528C95176F95}" type="datetimeFigureOut">
               <a:rPr lang="en-US" smtClean="0"/>
-              <a:t>8/22/21</a:t>
+              <a:t>8/27/21</a:t>
             </a:fld>
             <a:endParaRPr lang="en-US"/>
           </a:p>
@@ -1873,7 +2840,7 @@
 </p:sldLayout>
 </file>
 
-<file path=ppt/slideLayouts/slideLayout4.xml><?xml version="1.0" encoding="utf-8"?>
+<file path=ppt/slideLayouts/slideLayout5.xml><?xml version="1.0" encoding="utf-8"?>
 <p:sldLayout xmlns:a="http://schemas.openxmlformats.org/drawingml/2006/main" xmlns:r="http://schemas.openxmlformats.org/officeDocument/2006/relationships" xmlns:p="http://schemas.openxmlformats.org/presentationml/2006/main" type="secHead" preserve="1">
   <p:cSld name="Section Header">
     <p:spTree>
@@ -2075,7 +3042,7 @@
           <a:p>
             <a:fld id="{98D87B00-D02C-3C43-8451-528C95176F95}" type="datetimeFigureOut">
               <a:rPr lang="en-US" smtClean="0"/>
-              <a:t>8/22/21</a:t>
+              <a:t>8/27/21</a:t>
             </a:fld>
             <a:endParaRPr lang="en-US"/>
           </a:p>
@@ -2148,7 +3115,7 @@
 </p:sldLayout>
 </file>
 
-<file path=ppt/slideLayouts/slideLayout5.xml><?xml version="1.0" encoding="utf-8"?>
+<file path=ppt/slideLayouts/slideLayout6.xml><?xml version="1.0" encoding="utf-8"?>
 <p:sldLayout xmlns:a="http://schemas.openxmlformats.org/drawingml/2006/main" xmlns:r="http://schemas.openxmlformats.org/officeDocument/2006/relationships" xmlns:p="http://schemas.openxmlformats.org/presentationml/2006/main" type="twoObj" preserve="1">
   <p:cSld name="Two Content">
     <p:spTree>
@@ -2340,7 +3307,7 @@
           <a:p>
             <a:fld id="{98D87B00-D02C-3C43-8451-528C95176F95}" type="datetimeFigureOut">
               <a:rPr lang="en-US" smtClean="0"/>
-              <a:t>8/22/21</a:t>
+              <a:t>8/27/21</a:t>
             </a:fld>
             <a:endParaRPr lang="en-US"/>
           </a:p>
@@ -2413,7 +3380,7 @@
 </p:sldLayout>
 </file>
 
-<file path=ppt/slideLayouts/slideLayout6.xml><?xml version="1.0" encoding="utf-8"?>
+<file path=ppt/slideLayouts/slideLayout7.xml><?xml version="1.0" encoding="utf-8"?>
 <p:sldLayout xmlns:a="http://schemas.openxmlformats.org/drawingml/2006/main" xmlns:r="http://schemas.openxmlformats.org/officeDocument/2006/relationships" xmlns:p="http://schemas.openxmlformats.org/presentationml/2006/main" type="twoTxTwoObj" preserve="1">
   <p:cSld name="Comparison">
     <p:spTree>
@@ -2752,7 +3719,7 @@
           <a:p>
             <a:fld id="{98D87B00-D02C-3C43-8451-528C95176F95}" type="datetimeFigureOut">
               <a:rPr lang="en-US" smtClean="0"/>
-              <a:t>8/22/21</a:t>
+              <a:t>8/27/21</a:t>
             </a:fld>
             <a:endParaRPr lang="en-US"/>
           </a:p>
@@ -2825,7 +3792,7 @@
 </p:sldLayout>
 </file>
 
-<file path=ppt/slideLayouts/slideLayout7.xml><?xml version="1.0" encoding="utf-8"?>
+<file path=ppt/slideLayouts/slideLayout8.xml><?xml version="1.0" encoding="utf-8"?>
 <p:sldLayout xmlns:a="http://schemas.openxmlformats.org/drawingml/2006/main" xmlns:r="http://schemas.openxmlformats.org/officeDocument/2006/relationships" xmlns:p="http://schemas.openxmlformats.org/presentationml/2006/main" type="titleOnly" preserve="1">
   <p:cSld name="Title Only">
     <p:spTree>
@@ -2893,7 +3860,7 @@
           <a:p>
             <a:fld id="{98D87B00-D02C-3C43-8451-528C95176F95}" type="datetimeFigureOut">
               <a:rPr lang="en-US" smtClean="0"/>
-              <a:t>8/22/21</a:t>
+              <a:t>8/27/21</a:t>
             </a:fld>
             <a:endParaRPr lang="en-US"/>
           </a:p>
@@ -2966,7 +3933,7 @@
 </p:sldLayout>
 </file>
 
-<file path=ppt/slideLayouts/slideLayout8.xml><?xml version="1.0" encoding="utf-8"?>
+<file path=ppt/slideLayouts/slideLayout9.xml><?xml version="1.0" encoding="utf-8"?>
 <p:sldLayout xmlns:a="http://schemas.openxmlformats.org/drawingml/2006/main" xmlns:r="http://schemas.openxmlformats.org/officeDocument/2006/relationships" xmlns:p="http://schemas.openxmlformats.org/presentationml/2006/main" type="blank" preserve="1">
   <p:cSld name="Blank">
     <p:spTree>
@@ -3006,7 +3973,7 @@
           <a:p>
             <a:fld id="{98D87B00-D02C-3C43-8451-528C95176F95}" type="datetimeFigureOut">
               <a:rPr lang="en-US" smtClean="0"/>
-              <a:t>8/22/21</a:t>
+              <a:t>8/27/21</a:t>
             </a:fld>
             <a:endParaRPr lang="en-US"/>
           </a:p>
@@ -3070,317 +4037,6 @@
     <p:extLst>
       <p:ext uri="{BB962C8B-B14F-4D97-AF65-F5344CB8AC3E}">
         <p14:creationId xmlns:p14="http://schemas.microsoft.com/office/powerpoint/2010/main" val="166696720"/>
-      </p:ext>
-    </p:extLst>
-  </p:cSld>
-  <p:clrMapOvr>
-    <a:masterClrMapping/>
-  </p:clrMapOvr>
-</p:sldLayout>
-</file>
-
-<file path=ppt/slideLayouts/slideLayout9.xml><?xml version="1.0" encoding="utf-8"?>
-<p:sldLayout xmlns:a="http://schemas.openxmlformats.org/drawingml/2006/main" xmlns:r="http://schemas.openxmlformats.org/officeDocument/2006/relationships" xmlns:p="http://schemas.openxmlformats.org/presentationml/2006/main" type="objTx" preserve="1">
-  <p:cSld name="Content with Caption">
-    <p:spTree>
-      <p:nvGrpSpPr>
-        <p:cNvPr id="1" name=""/>
-        <p:cNvGrpSpPr/>
-        <p:nvPr/>
-      </p:nvGrpSpPr>
-      <p:grpSpPr>
-        <a:xfrm>
-          <a:off x="0" y="0"/>
-          <a:ext cx="0" cy="0"/>
-          <a:chOff x="0" y="0"/>
-          <a:chExt cx="0" cy="0"/>
-        </a:xfrm>
-      </p:grpSpPr>
-      <p:sp>
-        <p:nvSpPr>
-          <p:cNvPr id="2" name="Title 1">
-            <a:extLst>
-              <a:ext uri="{FF2B5EF4-FFF2-40B4-BE49-F238E27FC236}">
-                <a16:creationId xmlns:a16="http://schemas.microsoft.com/office/drawing/2014/main" id="{91C7DAE7-DEC0-3047-8B00-7B77109702CE}"/>
-              </a:ext>
-            </a:extLst>
-          </p:cNvPr>
-          <p:cNvSpPr>
-            <a:spLocks noGrp="1"/>
-          </p:cNvSpPr>
-          <p:nvPr>
-            <p:ph type="title"/>
-          </p:nvPr>
-        </p:nvSpPr>
-        <p:spPr>
-          <a:xfrm>
-            <a:off x="839788" y="457200"/>
-            <a:ext cx="3932237" cy="1600200"/>
-          </a:xfrm>
-        </p:spPr>
-        <p:txBody>
-          <a:bodyPr anchor="b"/>
-          <a:lstStyle>
-            <a:lvl1pPr>
-              <a:defRPr sz="3200"/>
-            </a:lvl1pPr>
-          </a:lstStyle>
-          <a:p>
-            <a:r>
-              <a:rPr lang="en-US"/>
-              <a:t>Click to edit Master title style</a:t>
-            </a:r>
-          </a:p>
-        </p:txBody>
-      </p:sp>
-      <p:sp>
-        <p:nvSpPr>
-          <p:cNvPr id="3" name="Content Placeholder 2">
-            <a:extLst>
-              <a:ext uri="{FF2B5EF4-FFF2-40B4-BE49-F238E27FC236}">
-                <a16:creationId xmlns:a16="http://schemas.microsoft.com/office/drawing/2014/main" id="{7CF8AE0F-F1FE-5A4A-9225-48E9AE12C2D6}"/>
-              </a:ext>
-            </a:extLst>
-          </p:cNvPr>
-          <p:cNvSpPr>
-            <a:spLocks noGrp="1"/>
-          </p:cNvSpPr>
-          <p:nvPr>
-            <p:ph idx="1"/>
-          </p:nvPr>
-        </p:nvSpPr>
-        <p:spPr>
-          <a:xfrm>
-            <a:off x="5183188" y="987425"/>
-            <a:ext cx="6172200" cy="4873625"/>
-          </a:xfrm>
-        </p:spPr>
-        <p:txBody>
-          <a:bodyPr/>
-          <a:lstStyle>
-            <a:lvl1pPr>
-              <a:defRPr sz="3200"/>
-            </a:lvl1pPr>
-            <a:lvl2pPr>
-              <a:defRPr sz="2800"/>
-            </a:lvl2pPr>
-            <a:lvl3pPr>
-              <a:defRPr sz="2400"/>
-            </a:lvl3pPr>
-            <a:lvl4pPr>
-              <a:defRPr sz="2000"/>
-            </a:lvl4pPr>
-            <a:lvl5pPr>
-              <a:defRPr sz="2000"/>
-            </a:lvl5pPr>
-            <a:lvl6pPr>
-              <a:defRPr sz="2000"/>
-            </a:lvl6pPr>
-            <a:lvl7pPr>
-              <a:defRPr sz="2000"/>
-            </a:lvl7pPr>
-            <a:lvl8pPr>
-              <a:defRPr sz="2000"/>
-            </a:lvl8pPr>
-            <a:lvl9pPr>
-              <a:defRPr sz="2000"/>
-            </a:lvl9pPr>
-          </a:lstStyle>
-          <a:p>
-            <a:pPr lvl="0"/>
-            <a:r>
-              <a:rPr lang="en-US"/>
-              <a:t>Click to edit Master text styles</a:t>
-            </a:r>
-          </a:p>
-          <a:p>
-            <a:pPr lvl="1"/>
-            <a:r>
-              <a:rPr lang="en-US"/>
-              <a:t>Second level</a:t>
-            </a:r>
-          </a:p>
-          <a:p>
-            <a:pPr lvl="2"/>
-            <a:r>
-              <a:rPr lang="en-US"/>
-              <a:t>Third level</a:t>
-            </a:r>
-          </a:p>
-          <a:p>
-            <a:pPr lvl="3"/>
-            <a:r>
-              <a:rPr lang="en-US"/>
-              <a:t>Fourth level</a:t>
-            </a:r>
-          </a:p>
-          <a:p>
-            <a:pPr lvl="4"/>
-            <a:r>
-              <a:rPr lang="en-US"/>
-              <a:t>Fifth level</a:t>
-            </a:r>
-          </a:p>
-        </p:txBody>
-      </p:sp>
-      <p:sp>
-        <p:nvSpPr>
-          <p:cNvPr id="4" name="Text Placeholder 3">
-            <a:extLst>
-              <a:ext uri="{FF2B5EF4-FFF2-40B4-BE49-F238E27FC236}">
-                <a16:creationId xmlns:a16="http://schemas.microsoft.com/office/drawing/2014/main" id="{0C891B01-0E48-4345-B722-450DB55BA01E}"/>
-              </a:ext>
-            </a:extLst>
-          </p:cNvPr>
-          <p:cNvSpPr>
-            <a:spLocks noGrp="1"/>
-          </p:cNvSpPr>
-          <p:nvPr>
-            <p:ph type="body" sz="half" idx="2"/>
-          </p:nvPr>
-        </p:nvSpPr>
-        <p:spPr>
-          <a:xfrm>
-            <a:off x="839788" y="2057400"/>
-            <a:ext cx="3932237" cy="3811588"/>
-          </a:xfrm>
-        </p:spPr>
-        <p:txBody>
-          <a:bodyPr/>
-          <a:lstStyle>
-            <a:lvl1pPr marL="0" indent="0">
-              <a:buNone/>
-              <a:defRPr sz="1600"/>
-            </a:lvl1pPr>
-            <a:lvl2pPr marL="457200" indent="0">
-              <a:buNone/>
-              <a:defRPr sz="1400"/>
-            </a:lvl2pPr>
-            <a:lvl3pPr marL="914400" indent="0">
-              <a:buNone/>
-              <a:defRPr sz="1200"/>
-            </a:lvl3pPr>
-            <a:lvl4pPr marL="1371600" indent="0">
-              <a:buNone/>
-              <a:defRPr sz="1000"/>
-            </a:lvl4pPr>
-            <a:lvl5pPr marL="1828800" indent="0">
-              <a:buNone/>
-              <a:defRPr sz="1000"/>
-            </a:lvl5pPr>
-            <a:lvl6pPr marL="2286000" indent="0">
-              <a:buNone/>
-              <a:defRPr sz="1000"/>
-            </a:lvl6pPr>
-            <a:lvl7pPr marL="2743200" indent="0">
-              <a:buNone/>
-              <a:defRPr sz="1000"/>
-            </a:lvl7pPr>
-            <a:lvl8pPr marL="3200400" indent="0">
-              <a:buNone/>
-              <a:defRPr sz="1000"/>
-            </a:lvl8pPr>
-            <a:lvl9pPr marL="3657600" indent="0">
-              <a:buNone/>
-              <a:defRPr sz="1000"/>
-            </a:lvl9pPr>
-          </a:lstStyle>
-          <a:p>
-            <a:pPr lvl="0"/>
-            <a:r>
-              <a:rPr lang="en-US"/>
-              <a:t>Click to edit Master text styles</a:t>
-            </a:r>
-          </a:p>
-        </p:txBody>
-      </p:sp>
-      <p:sp>
-        <p:nvSpPr>
-          <p:cNvPr id="5" name="Date Placeholder 4">
-            <a:extLst>
-              <a:ext uri="{FF2B5EF4-FFF2-40B4-BE49-F238E27FC236}">
-                <a16:creationId xmlns:a16="http://schemas.microsoft.com/office/drawing/2014/main" id="{AAD2F25C-EA62-9B48-8583-5BB8F034F071}"/>
-              </a:ext>
-            </a:extLst>
-          </p:cNvPr>
-          <p:cNvSpPr>
-            <a:spLocks noGrp="1"/>
-          </p:cNvSpPr>
-          <p:nvPr>
-            <p:ph type="dt" sz="half" idx="10"/>
-          </p:nvPr>
-        </p:nvSpPr>
-        <p:spPr/>
-        <p:txBody>
-          <a:bodyPr/>
-          <a:lstStyle/>
-          <a:p>
-            <a:fld id="{98D87B00-D02C-3C43-8451-528C95176F95}" type="datetimeFigureOut">
-              <a:rPr lang="en-US" smtClean="0"/>
-              <a:t>8/22/21</a:t>
-            </a:fld>
-            <a:endParaRPr lang="en-US"/>
-          </a:p>
-        </p:txBody>
-      </p:sp>
-      <p:sp>
-        <p:nvSpPr>
-          <p:cNvPr id="6" name="Footer Placeholder 5">
-            <a:extLst>
-              <a:ext uri="{FF2B5EF4-FFF2-40B4-BE49-F238E27FC236}">
-                <a16:creationId xmlns:a16="http://schemas.microsoft.com/office/drawing/2014/main" id="{80D7CE33-C766-0248-BFC0-D781840D468E}"/>
-              </a:ext>
-            </a:extLst>
-          </p:cNvPr>
-          <p:cNvSpPr>
-            <a:spLocks noGrp="1"/>
-          </p:cNvSpPr>
-          <p:nvPr>
-            <p:ph type="ftr" sz="quarter" idx="11"/>
-          </p:nvPr>
-        </p:nvSpPr>
-        <p:spPr/>
-        <p:txBody>
-          <a:bodyPr/>
-          <a:lstStyle/>
-          <a:p>
-            <a:endParaRPr lang="en-US"/>
-          </a:p>
-        </p:txBody>
-      </p:sp>
-      <p:sp>
-        <p:nvSpPr>
-          <p:cNvPr id="7" name="Slide Number Placeholder 6">
-            <a:extLst>
-              <a:ext uri="{FF2B5EF4-FFF2-40B4-BE49-F238E27FC236}">
-                <a16:creationId xmlns:a16="http://schemas.microsoft.com/office/drawing/2014/main" id="{54152953-FF8E-5348-8A98-ACF40D33AAB2}"/>
-              </a:ext>
-            </a:extLst>
-          </p:cNvPr>
-          <p:cNvSpPr>
-            <a:spLocks noGrp="1"/>
-          </p:cNvSpPr>
-          <p:nvPr>
-            <p:ph type="sldNum" sz="quarter" idx="12"/>
-          </p:nvPr>
-        </p:nvSpPr>
-        <p:spPr/>
-        <p:txBody>
-          <a:bodyPr/>
-          <a:lstStyle/>
-          <a:p>
-            <a:fld id="{BA44168E-86A5-E643-B889-0D08F43ABB6D}" type="slidenum">
-              <a:rPr lang="en-US" smtClean="0"/>
-              <a:t>‹#›</a:t>
-            </a:fld>
-            <a:endParaRPr lang="en-US"/>
-          </a:p>
-        </p:txBody>
-      </p:sp>
-    </p:spTree>
-    <p:extLst>
-      <p:ext uri="{BB962C8B-B14F-4D97-AF65-F5344CB8AC3E}">
-        <p14:creationId xmlns:p14="http://schemas.microsoft.com/office/powerpoint/2010/main" val="234694950"/>
       </p:ext>
     </p:extLst>
   </p:cSld>
@@ -3558,7 +4214,7 @@
           <a:p>
             <a:fld id="{98D87B00-D02C-3C43-8451-528C95176F95}" type="datetimeFigureOut">
               <a:rPr lang="en-US" smtClean="0"/>
-              <a:t>8/22/21</a:t>
+              <a:t>8/27/21</a:t>
             </a:fld>
             <a:endParaRPr lang="en-US"/>
           </a:p>
@@ -3665,16 +4321,17 @@
   <p:sldLayoutIdLst>
     <p:sldLayoutId id="2147483649" r:id="rId1"/>
     <p:sldLayoutId id="2147483660" r:id="rId2"/>
-    <p:sldLayoutId id="2147483650" r:id="rId3"/>
-    <p:sldLayoutId id="2147483651" r:id="rId4"/>
-    <p:sldLayoutId id="2147483652" r:id="rId5"/>
-    <p:sldLayoutId id="2147483653" r:id="rId6"/>
-    <p:sldLayoutId id="2147483654" r:id="rId7"/>
-    <p:sldLayoutId id="2147483655" r:id="rId8"/>
-    <p:sldLayoutId id="2147483656" r:id="rId9"/>
-    <p:sldLayoutId id="2147483657" r:id="rId10"/>
-    <p:sldLayoutId id="2147483658" r:id="rId11"/>
-    <p:sldLayoutId id="2147483659" r:id="rId12"/>
+    <p:sldLayoutId id="2147483661" r:id="rId3"/>
+    <p:sldLayoutId id="2147483650" r:id="rId4"/>
+    <p:sldLayoutId id="2147483651" r:id="rId5"/>
+    <p:sldLayoutId id="2147483652" r:id="rId6"/>
+    <p:sldLayoutId id="2147483653" r:id="rId7"/>
+    <p:sldLayoutId id="2147483654" r:id="rId8"/>
+    <p:sldLayoutId id="2147483655" r:id="rId9"/>
+    <p:sldLayoutId id="2147483656" r:id="rId10"/>
+    <p:sldLayoutId id="2147483657" r:id="rId11"/>
+    <p:sldLayoutId id="2147483658" r:id="rId12"/>
+    <p:sldLayoutId id="2147483659" r:id="rId13"/>
   </p:sldLayoutIdLst>
   <p:txStyles>
     <p:titleStyle>
@@ -3957,86 +4614,6 @@
     </p:otherStyle>
   </p:txStyles>
 </p:sldMaster>
-</file>
-
-<file path=ppt/slides/slide1.xml><?xml version="1.0" encoding="utf-8"?>
-<p:sld xmlns:a="http://schemas.openxmlformats.org/drawingml/2006/main" xmlns:r="http://schemas.openxmlformats.org/officeDocument/2006/relationships" xmlns:p="http://schemas.openxmlformats.org/presentationml/2006/main">
-  <p:cSld>
-    <p:spTree>
-      <p:nvGrpSpPr>
-        <p:cNvPr id="1" name=""/>
-        <p:cNvGrpSpPr/>
-        <p:nvPr/>
-      </p:nvGrpSpPr>
-      <p:grpSpPr>
-        <a:xfrm>
-          <a:off x="0" y="0"/>
-          <a:ext cx="0" cy="0"/>
-          <a:chOff x="0" y="0"/>
-          <a:chExt cx="0" cy="0"/>
-        </a:xfrm>
-      </p:grpSpPr>
-      <p:sp>
-        <p:nvSpPr>
-          <p:cNvPr id="2" name="Title 1">
-            <a:extLst>
-              <a:ext uri="{FF2B5EF4-FFF2-40B4-BE49-F238E27FC236}">
-                <a16:creationId xmlns:a16="http://schemas.microsoft.com/office/drawing/2014/main" id="{4969B853-152F-4141-B386-4221A97BB334}"/>
-              </a:ext>
-            </a:extLst>
-          </p:cNvPr>
-          <p:cNvSpPr>
-            <a:spLocks noGrp="1"/>
-          </p:cNvSpPr>
-          <p:nvPr>
-            <p:ph type="ctrTitle"/>
-          </p:nvPr>
-        </p:nvSpPr>
-        <p:spPr/>
-        <p:txBody>
-          <a:bodyPr/>
-          <a:lstStyle/>
-          <a:p>
-            <a:endParaRPr lang="en-US"/>
-          </a:p>
-        </p:txBody>
-      </p:sp>
-      <p:sp>
-        <p:nvSpPr>
-          <p:cNvPr id="3" name="Subtitle 2">
-            <a:extLst>
-              <a:ext uri="{FF2B5EF4-FFF2-40B4-BE49-F238E27FC236}">
-                <a16:creationId xmlns:a16="http://schemas.microsoft.com/office/drawing/2014/main" id="{D7369A54-E4D4-D14F-9125-5AABC514AF42}"/>
-              </a:ext>
-            </a:extLst>
-          </p:cNvPr>
-          <p:cNvSpPr>
-            <a:spLocks noGrp="1"/>
-          </p:cNvSpPr>
-          <p:nvPr>
-            <p:ph type="subTitle" idx="1"/>
-          </p:nvPr>
-        </p:nvSpPr>
-        <p:spPr/>
-        <p:txBody>
-          <a:bodyPr/>
-          <a:lstStyle/>
-          <a:p>
-            <a:endParaRPr lang="en-US"/>
-          </a:p>
-        </p:txBody>
-      </p:sp>
-    </p:spTree>
-    <p:extLst>
-      <p:ext uri="{BB962C8B-B14F-4D97-AF65-F5344CB8AC3E}">
-        <p14:creationId xmlns:p14="http://schemas.microsoft.com/office/powerpoint/2010/main" val="559789262"/>
-      </p:ext>
-    </p:extLst>
-  </p:cSld>
-  <p:clrMapOvr>
-    <a:masterClrMapping/>
-  </p:clrMapOvr>
-</p:sld>
 </file>
 
 <file path=ppt/theme/theme1.xml><?xml version="1.0" encoding="utf-8"?>

</xml_diff>

<commit_message>
Add/update for cort admin, CRH cFos project, make sampling ppts general
</commit_message>
<xml_diff>
--- a/samplingSlideTemplate.pptx
+++ b/samplingSlideTemplate.pptx
@@ -256,7 +256,7 @@
           <a:p>
             <a:fld id="{98D87B00-D02C-3C43-8451-528C95176F95}" type="datetimeFigureOut">
               <a:rPr lang="en-US" smtClean="0"/>
-              <a:t>8/27/21</a:t>
+              <a:t>7/15/2022</a:t>
             </a:fld>
             <a:endParaRPr lang="en-US"/>
           </a:p>
@@ -330,6 +330,260 @@
 </file>
 
 <file path=ppt/slideLayouts/slideLayout10.xml><?xml version="1.0" encoding="utf-8"?>
+<p:sldLayout xmlns:a="http://schemas.openxmlformats.org/drawingml/2006/main" xmlns:r="http://schemas.openxmlformats.org/officeDocument/2006/relationships" xmlns:p="http://schemas.openxmlformats.org/presentationml/2006/main" type="titleOnly" preserve="1">
+  <p:cSld name="Title Only">
+    <p:spTree>
+      <p:nvGrpSpPr>
+        <p:cNvPr id="1" name=""/>
+        <p:cNvGrpSpPr/>
+        <p:nvPr/>
+      </p:nvGrpSpPr>
+      <p:grpSpPr>
+        <a:xfrm>
+          <a:off x="0" y="0"/>
+          <a:ext cx="0" cy="0"/>
+          <a:chOff x="0" y="0"/>
+          <a:chExt cx="0" cy="0"/>
+        </a:xfrm>
+      </p:grpSpPr>
+      <p:sp>
+        <p:nvSpPr>
+          <p:cNvPr id="2" name="Title 1">
+            <a:extLst>
+              <a:ext uri="{FF2B5EF4-FFF2-40B4-BE49-F238E27FC236}">
+                <a16:creationId xmlns:a16="http://schemas.microsoft.com/office/drawing/2014/main" id="{22AF3F2E-26FE-7747-A107-220F84EA7EC2}"/>
+              </a:ext>
+            </a:extLst>
+          </p:cNvPr>
+          <p:cNvSpPr>
+            <a:spLocks noGrp="1"/>
+          </p:cNvSpPr>
+          <p:nvPr>
+            <p:ph type="title"/>
+          </p:nvPr>
+        </p:nvSpPr>
+        <p:spPr/>
+        <p:txBody>
+          <a:bodyPr/>
+          <a:lstStyle/>
+          <a:p>
+            <a:r>
+              <a:rPr lang="en-US"/>
+              <a:t>Click to edit Master title style</a:t>
+            </a:r>
+          </a:p>
+        </p:txBody>
+      </p:sp>
+      <p:sp>
+        <p:nvSpPr>
+          <p:cNvPr id="3" name="Date Placeholder 2">
+            <a:extLst>
+              <a:ext uri="{FF2B5EF4-FFF2-40B4-BE49-F238E27FC236}">
+                <a16:creationId xmlns:a16="http://schemas.microsoft.com/office/drawing/2014/main" id="{DB82431A-789A-E74B-900D-6214F8DC165A}"/>
+              </a:ext>
+            </a:extLst>
+          </p:cNvPr>
+          <p:cNvSpPr>
+            <a:spLocks noGrp="1"/>
+          </p:cNvSpPr>
+          <p:nvPr>
+            <p:ph type="dt" sz="half" idx="10"/>
+          </p:nvPr>
+        </p:nvSpPr>
+        <p:spPr/>
+        <p:txBody>
+          <a:bodyPr/>
+          <a:lstStyle/>
+          <a:p>
+            <a:fld id="{98D87B00-D02C-3C43-8451-528C95176F95}" type="datetimeFigureOut">
+              <a:rPr lang="en-US" smtClean="0"/>
+              <a:t>7/15/2022</a:t>
+            </a:fld>
+            <a:endParaRPr lang="en-US"/>
+          </a:p>
+        </p:txBody>
+      </p:sp>
+      <p:sp>
+        <p:nvSpPr>
+          <p:cNvPr id="4" name="Footer Placeholder 3">
+            <a:extLst>
+              <a:ext uri="{FF2B5EF4-FFF2-40B4-BE49-F238E27FC236}">
+                <a16:creationId xmlns:a16="http://schemas.microsoft.com/office/drawing/2014/main" id="{9B425FFA-28EE-324C-89C2-C12068B22B8A}"/>
+              </a:ext>
+            </a:extLst>
+          </p:cNvPr>
+          <p:cNvSpPr>
+            <a:spLocks noGrp="1"/>
+          </p:cNvSpPr>
+          <p:nvPr>
+            <p:ph type="ftr" sz="quarter" idx="11"/>
+          </p:nvPr>
+        </p:nvSpPr>
+        <p:spPr/>
+        <p:txBody>
+          <a:bodyPr/>
+          <a:lstStyle/>
+          <a:p>
+            <a:endParaRPr lang="en-US"/>
+          </a:p>
+        </p:txBody>
+      </p:sp>
+      <p:sp>
+        <p:nvSpPr>
+          <p:cNvPr id="5" name="Slide Number Placeholder 4">
+            <a:extLst>
+              <a:ext uri="{FF2B5EF4-FFF2-40B4-BE49-F238E27FC236}">
+                <a16:creationId xmlns:a16="http://schemas.microsoft.com/office/drawing/2014/main" id="{3C169F66-3FB6-2245-9FBE-619C01FA1FDF}"/>
+              </a:ext>
+            </a:extLst>
+          </p:cNvPr>
+          <p:cNvSpPr>
+            <a:spLocks noGrp="1"/>
+          </p:cNvSpPr>
+          <p:nvPr>
+            <p:ph type="sldNum" sz="quarter" idx="12"/>
+          </p:nvPr>
+        </p:nvSpPr>
+        <p:spPr/>
+        <p:txBody>
+          <a:bodyPr/>
+          <a:lstStyle/>
+          <a:p>
+            <a:fld id="{BA44168E-86A5-E643-B889-0D08F43ABB6D}" type="slidenum">
+              <a:rPr lang="en-US" smtClean="0"/>
+              <a:t>‹#›</a:t>
+            </a:fld>
+            <a:endParaRPr lang="en-US"/>
+          </a:p>
+        </p:txBody>
+      </p:sp>
+    </p:spTree>
+    <p:extLst>
+      <p:ext uri="{BB962C8B-B14F-4D97-AF65-F5344CB8AC3E}">
+        <p14:creationId xmlns:p14="http://schemas.microsoft.com/office/powerpoint/2010/main" val="2233107899"/>
+      </p:ext>
+    </p:extLst>
+  </p:cSld>
+  <p:clrMapOvr>
+    <a:masterClrMapping/>
+  </p:clrMapOvr>
+</p:sldLayout>
+</file>
+
+<file path=ppt/slideLayouts/slideLayout11.xml><?xml version="1.0" encoding="utf-8"?>
+<p:sldLayout xmlns:a="http://schemas.openxmlformats.org/drawingml/2006/main" xmlns:r="http://schemas.openxmlformats.org/officeDocument/2006/relationships" xmlns:p="http://schemas.openxmlformats.org/presentationml/2006/main" type="blank" preserve="1">
+  <p:cSld name="Blank">
+    <p:spTree>
+      <p:nvGrpSpPr>
+        <p:cNvPr id="1" name=""/>
+        <p:cNvGrpSpPr/>
+        <p:nvPr/>
+      </p:nvGrpSpPr>
+      <p:grpSpPr>
+        <a:xfrm>
+          <a:off x="0" y="0"/>
+          <a:ext cx="0" cy="0"/>
+          <a:chOff x="0" y="0"/>
+          <a:chExt cx="0" cy="0"/>
+        </a:xfrm>
+      </p:grpSpPr>
+      <p:sp>
+        <p:nvSpPr>
+          <p:cNvPr id="2" name="Date Placeholder 1">
+            <a:extLst>
+              <a:ext uri="{FF2B5EF4-FFF2-40B4-BE49-F238E27FC236}">
+                <a16:creationId xmlns:a16="http://schemas.microsoft.com/office/drawing/2014/main" id="{7166858D-B49F-5640-9FB7-DFA79A0CF7F1}"/>
+              </a:ext>
+            </a:extLst>
+          </p:cNvPr>
+          <p:cNvSpPr>
+            <a:spLocks noGrp="1"/>
+          </p:cNvSpPr>
+          <p:nvPr>
+            <p:ph type="dt" sz="half" idx="10"/>
+          </p:nvPr>
+        </p:nvSpPr>
+        <p:spPr/>
+        <p:txBody>
+          <a:bodyPr/>
+          <a:lstStyle/>
+          <a:p>
+            <a:fld id="{98D87B00-D02C-3C43-8451-528C95176F95}" type="datetimeFigureOut">
+              <a:rPr lang="en-US" smtClean="0"/>
+              <a:t>7/15/2022</a:t>
+            </a:fld>
+            <a:endParaRPr lang="en-US"/>
+          </a:p>
+        </p:txBody>
+      </p:sp>
+      <p:sp>
+        <p:nvSpPr>
+          <p:cNvPr id="3" name="Footer Placeholder 2">
+            <a:extLst>
+              <a:ext uri="{FF2B5EF4-FFF2-40B4-BE49-F238E27FC236}">
+                <a16:creationId xmlns:a16="http://schemas.microsoft.com/office/drawing/2014/main" id="{66091A7B-09EF-E148-BD78-6435254EB92B}"/>
+              </a:ext>
+            </a:extLst>
+          </p:cNvPr>
+          <p:cNvSpPr>
+            <a:spLocks noGrp="1"/>
+          </p:cNvSpPr>
+          <p:nvPr>
+            <p:ph type="ftr" sz="quarter" idx="11"/>
+          </p:nvPr>
+        </p:nvSpPr>
+        <p:spPr/>
+        <p:txBody>
+          <a:bodyPr/>
+          <a:lstStyle/>
+          <a:p>
+            <a:endParaRPr lang="en-US"/>
+          </a:p>
+        </p:txBody>
+      </p:sp>
+      <p:sp>
+        <p:nvSpPr>
+          <p:cNvPr id="4" name="Slide Number Placeholder 3">
+            <a:extLst>
+              <a:ext uri="{FF2B5EF4-FFF2-40B4-BE49-F238E27FC236}">
+                <a16:creationId xmlns:a16="http://schemas.microsoft.com/office/drawing/2014/main" id="{DC39D03D-D72A-2D49-9ABE-86873662A4AE}"/>
+              </a:ext>
+            </a:extLst>
+          </p:cNvPr>
+          <p:cNvSpPr>
+            <a:spLocks noGrp="1"/>
+          </p:cNvSpPr>
+          <p:nvPr>
+            <p:ph type="sldNum" sz="quarter" idx="12"/>
+          </p:nvPr>
+        </p:nvSpPr>
+        <p:spPr/>
+        <p:txBody>
+          <a:bodyPr/>
+          <a:lstStyle/>
+          <a:p>
+            <a:fld id="{BA44168E-86A5-E643-B889-0D08F43ABB6D}" type="slidenum">
+              <a:rPr lang="en-US" smtClean="0"/>
+              <a:t>‹#›</a:t>
+            </a:fld>
+            <a:endParaRPr lang="en-US"/>
+          </a:p>
+        </p:txBody>
+      </p:sp>
+    </p:spTree>
+    <p:extLst>
+      <p:ext uri="{BB962C8B-B14F-4D97-AF65-F5344CB8AC3E}">
+        <p14:creationId xmlns:p14="http://schemas.microsoft.com/office/powerpoint/2010/main" val="166696720"/>
+      </p:ext>
+    </p:extLst>
+  </p:cSld>
+  <p:clrMapOvr>
+    <a:masterClrMapping/>
+  </p:clrMapOvr>
+</p:sldLayout>
+</file>
+
+<file path=ppt/slideLayouts/slideLayout12.xml><?xml version="1.0" encoding="utf-8"?>
 <p:sldLayout xmlns:a="http://schemas.openxmlformats.org/drawingml/2006/main" xmlns:r="http://schemas.openxmlformats.org/officeDocument/2006/relationships" xmlns:p="http://schemas.openxmlformats.org/presentationml/2006/main" type="objTx" preserve="1">
   <p:cSld name="Content with Caption">
     <p:spTree>
@@ -567,7 +821,7 @@
           <a:p>
             <a:fld id="{98D87B00-D02C-3C43-8451-528C95176F95}" type="datetimeFigureOut">
               <a:rPr lang="en-US" smtClean="0"/>
-              <a:t>8/27/21</a:t>
+              <a:t>7/15/2022</a:t>
             </a:fld>
             <a:endParaRPr lang="en-US"/>
           </a:p>
@@ -640,7 +894,7 @@
 </p:sldLayout>
 </file>
 
-<file path=ppt/slideLayouts/slideLayout11.xml><?xml version="1.0" encoding="utf-8"?>
+<file path=ppt/slideLayouts/slideLayout13.xml><?xml version="1.0" encoding="utf-8"?>
 <p:sldLayout xmlns:a="http://schemas.openxmlformats.org/drawingml/2006/main" xmlns:r="http://schemas.openxmlformats.org/officeDocument/2006/relationships" xmlns:p="http://schemas.openxmlformats.org/presentationml/2006/main" type="picTx" preserve="1">
   <p:cSld name="Picture with Caption">
     <p:spTree>
@@ -855,7 +1109,7 @@
           <a:p>
             <a:fld id="{98D87B00-D02C-3C43-8451-528C95176F95}" type="datetimeFigureOut">
               <a:rPr lang="en-US" smtClean="0"/>
-              <a:t>8/27/21</a:t>
+              <a:t>7/15/2022</a:t>
             </a:fld>
             <a:endParaRPr lang="en-US"/>
           </a:p>
@@ -928,7 +1182,7 @@
 </p:sldLayout>
 </file>
 
-<file path=ppt/slideLayouts/slideLayout12.xml><?xml version="1.0" encoding="utf-8"?>
+<file path=ppt/slideLayouts/slideLayout14.xml><?xml version="1.0" encoding="utf-8"?>
 <p:sldLayout xmlns:a="http://schemas.openxmlformats.org/drawingml/2006/main" xmlns:r="http://schemas.openxmlformats.org/officeDocument/2006/relationships" xmlns:p="http://schemas.openxmlformats.org/presentationml/2006/main" type="vertTx" preserve="1">
   <p:cSld name="Title and Vertical Text">
     <p:spTree>
@@ -1053,7 +1307,7 @@
           <a:p>
             <a:fld id="{98D87B00-D02C-3C43-8451-528C95176F95}" type="datetimeFigureOut">
               <a:rPr lang="en-US" smtClean="0"/>
-              <a:t>8/27/21</a:t>
+              <a:t>7/15/2022</a:t>
             </a:fld>
             <a:endParaRPr lang="en-US"/>
           </a:p>
@@ -1126,7 +1380,7 @@
 </p:sldLayout>
 </file>
 
-<file path=ppt/slideLayouts/slideLayout13.xml><?xml version="1.0" encoding="utf-8"?>
+<file path=ppt/slideLayouts/slideLayout15.xml><?xml version="1.0" encoding="utf-8"?>
 <p:sldLayout xmlns:a="http://schemas.openxmlformats.org/drawingml/2006/main" xmlns:r="http://schemas.openxmlformats.org/officeDocument/2006/relationships" xmlns:p="http://schemas.openxmlformats.org/presentationml/2006/main" type="vertTitleAndTx" preserve="1">
   <p:cSld name="Vertical Title and Text">
     <p:spTree>
@@ -1261,7 +1515,7 @@
           <a:p>
             <a:fld id="{98D87B00-D02C-3C43-8451-528C95176F95}" type="datetimeFigureOut">
               <a:rPr lang="en-US" smtClean="0"/>
-              <a:t>8/27/21</a:t>
+              <a:t>7/15/2022</a:t>
             </a:fld>
             <a:endParaRPr lang="en-US"/>
           </a:p>
@@ -2643,6 +2897,1500 @@
 </file>
 
 <file path=ppt/slideLayouts/slideLayout4.xml><?xml version="1.0" encoding="utf-8"?>
+<p:sldLayout xmlns:a="http://schemas.openxmlformats.org/drawingml/2006/main" xmlns:r="http://schemas.openxmlformats.org/officeDocument/2006/relationships" xmlns:p="http://schemas.openxmlformats.org/presentationml/2006/main" preserve="1" userDrawn="1">
+  <p:cSld name="samplingSlide3">
+    <p:spTree>
+      <p:nvGrpSpPr>
+        <p:cNvPr id="1" name=""/>
+        <p:cNvGrpSpPr/>
+        <p:nvPr/>
+      </p:nvGrpSpPr>
+      <p:grpSpPr>
+        <a:xfrm>
+          <a:off x="0" y="0"/>
+          <a:ext cx="0" cy="0"/>
+          <a:chOff x="0" y="0"/>
+          <a:chExt cx="0" cy="0"/>
+        </a:xfrm>
+      </p:grpSpPr>
+      <p:sp>
+        <p:nvSpPr>
+          <p:cNvPr id="16" name="maxLH">
+            <a:extLst>
+              <a:ext uri="{FF2B5EF4-FFF2-40B4-BE49-F238E27FC236}">
+                <a16:creationId xmlns:a16="http://schemas.microsoft.com/office/drawing/2014/main" id="{00A513FC-BAB5-4442-80A9-FB6B5801FFF9}"/>
+              </a:ext>
+            </a:extLst>
+          </p:cNvPr>
+          <p:cNvSpPr>
+            <a:spLocks noGrp="1"/>
+          </p:cNvSpPr>
+          <p:nvPr>
+            <p:ph sz="quarter" idx="22" hasCustomPrompt="1"/>
+          </p:nvPr>
+        </p:nvSpPr>
+        <p:spPr>
+          <a:xfrm>
+            <a:off x="8675597" y="-804"/>
+            <a:ext cx="3397456" cy="1325562"/>
+          </a:xfrm>
+        </p:spPr>
+        <p:txBody>
+          <a:bodyPr anchor="ctr">
+            <a:normAutofit/>
+          </a:bodyPr>
+          <a:lstStyle>
+            <a:lvl1pPr marL="0" indent="0" algn="l" defTabSz="914400" rtl="0" eaLnBrk="1" latinLnBrk="0" hangingPunct="1">
+              <a:lnSpc>
+                <a:spcPct val="90000"/>
+              </a:lnSpc>
+              <a:spcBef>
+                <a:spcPct val="0"/>
+              </a:spcBef>
+              <a:buNone/>
+              <a:defRPr lang="en-US" sz="3200" kern="1200" dirty="0">
+                <a:solidFill>
+                  <a:schemeClr val="tx1"/>
+                </a:solidFill>
+                <a:latin typeface="Arial" panose="020B0604020202020204" pitchFamily="34" charset="0"/>
+                <a:ea typeface="+mj-ea"/>
+                <a:cs typeface="Arial" panose="020B0604020202020204" pitchFamily="34" charset="0"/>
+              </a:defRPr>
+            </a:lvl1pPr>
+          </a:lstStyle>
+          <a:p>
+            <a:pPr lvl="0"/>
+            <a:r>
+              <a:rPr lang="en-US" dirty="0"/>
+              <a:t>Max LH:</a:t>
+            </a:r>
+          </a:p>
+        </p:txBody>
+      </p:sp>
+      <p:sp>
+        <p:nvSpPr>
+          <p:cNvPr id="15" name="cyclePlot">
+            <a:extLst>
+              <a:ext uri="{FF2B5EF4-FFF2-40B4-BE49-F238E27FC236}">
+                <a16:creationId xmlns:a16="http://schemas.microsoft.com/office/drawing/2014/main" id="{C473C8D3-71AE-9341-BE9B-BFF30B1490AC}"/>
+              </a:ext>
+            </a:extLst>
+          </p:cNvPr>
+          <p:cNvSpPr>
+            <a:spLocks noGrp="1"/>
+          </p:cNvSpPr>
+          <p:nvPr>
+            <p:ph sz="quarter" idx="21" hasCustomPrompt="1"/>
+          </p:nvPr>
+        </p:nvSpPr>
+        <p:spPr>
+          <a:xfrm>
+            <a:off x="118947" y="2796144"/>
+            <a:ext cx="3812883" cy="2717966"/>
+          </a:xfrm>
+        </p:spPr>
+        <p:txBody>
+          <a:bodyPr/>
+          <a:lstStyle>
+            <a:lvl1pPr marL="0" indent="0">
+              <a:buNone/>
+              <a:defRPr/>
+            </a:lvl1pPr>
+          </a:lstStyle>
+          <a:p>
+            <a:pPr lvl="0"/>
+            <a:r>
+              <a:rPr lang="en-US" dirty="0"/>
+              <a:t>Cycle</a:t>
+            </a:r>
+          </a:p>
+        </p:txBody>
+      </p:sp>
+      <p:sp>
+        <p:nvSpPr>
+          <p:cNvPr id="7" name="2 days before">
+            <a:extLst>
+              <a:ext uri="{FF2B5EF4-FFF2-40B4-BE49-F238E27FC236}">
+                <a16:creationId xmlns:a16="http://schemas.microsoft.com/office/drawing/2014/main" id="{2C3790EE-D439-B948-A520-A3EC787BAACD}"/>
+              </a:ext>
+            </a:extLst>
+          </p:cNvPr>
+          <p:cNvSpPr txBox="1"/>
+          <p:nvPr userDrawn="1"/>
+        </p:nvSpPr>
+        <p:spPr>
+          <a:xfrm>
+            <a:off x="3936680" y="1396052"/>
+            <a:ext cx="461665" cy="2759074"/>
+          </a:xfrm>
+          <a:prstGeom prst="rect">
+            <a:avLst/>
+          </a:prstGeom>
+          <a:noFill/>
+        </p:spPr>
+        <p:txBody>
+          <a:bodyPr vert="vert270" wrap="square" rtlCol="0">
+            <a:spAutoFit/>
+          </a:bodyPr>
+          <a:lstStyle/>
+          <a:p>
+            <a:pPr algn="ctr"/>
+            <a:r>
+              <a:rPr lang="en-US" dirty="0">
+                <a:latin typeface="Arial" panose="020B0604020202020204" pitchFamily="34" charset="0"/>
+                <a:cs typeface="Arial" panose="020B0604020202020204" pitchFamily="34" charset="0"/>
+              </a:rPr>
+              <a:t>2 days before</a:t>
+            </a:r>
+          </a:p>
+        </p:txBody>
+      </p:sp>
+      <p:sp>
+        <p:nvSpPr>
+          <p:cNvPr id="8" name="previous day">
+            <a:extLst>
+              <a:ext uri="{FF2B5EF4-FFF2-40B4-BE49-F238E27FC236}">
+                <a16:creationId xmlns:a16="http://schemas.microsoft.com/office/drawing/2014/main" id="{627E77C6-4F38-C84D-8019-FAE3364DA784}"/>
+              </a:ext>
+            </a:extLst>
+          </p:cNvPr>
+          <p:cNvSpPr txBox="1"/>
+          <p:nvPr userDrawn="1"/>
+        </p:nvSpPr>
+        <p:spPr>
+          <a:xfrm>
+            <a:off x="3935607" y="4140034"/>
+            <a:ext cx="461665" cy="2717966"/>
+          </a:xfrm>
+          <a:prstGeom prst="rect">
+            <a:avLst/>
+          </a:prstGeom>
+          <a:noFill/>
+        </p:spPr>
+        <p:txBody>
+          <a:bodyPr vert="vert270" wrap="square" rtlCol="0">
+            <a:spAutoFit/>
+          </a:bodyPr>
+          <a:lstStyle/>
+          <a:p>
+            <a:pPr algn="ctr"/>
+            <a:r>
+              <a:rPr lang="en-US" dirty="0">
+                <a:latin typeface="Arial" panose="020B0604020202020204" pitchFamily="34" charset="0"/>
+                <a:cs typeface="Arial" panose="020B0604020202020204" pitchFamily="34" charset="0"/>
+              </a:rPr>
+              <a:t>Previous day</a:t>
+            </a:r>
+          </a:p>
+        </p:txBody>
+      </p:sp>
+      <p:sp>
+        <p:nvSpPr>
+          <p:cNvPr id="9" name="am">
+            <a:extLst>
+              <a:ext uri="{FF2B5EF4-FFF2-40B4-BE49-F238E27FC236}">
+                <a16:creationId xmlns:a16="http://schemas.microsoft.com/office/drawing/2014/main" id="{9F2F03F3-A825-A34C-8C77-8125408D5213}"/>
+              </a:ext>
+            </a:extLst>
+          </p:cNvPr>
+          <p:cNvSpPr txBox="1"/>
+          <p:nvPr userDrawn="1"/>
+        </p:nvSpPr>
+        <p:spPr>
+          <a:xfrm>
+            <a:off x="8210155" y="1396051"/>
+            <a:ext cx="461665" cy="2717965"/>
+          </a:xfrm>
+          <a:prstGeom prst="rect">
+            <a:avLst/>
+          </a:prstGeom>
+          <a:noFill/>
+        </p:spPr>
+        <p:txBody>
+          <a:bodyPr vert="vert270" wrap="square" rtlCol="0">
+            <a:spAutoFit/>
+          </a:bodyPr>
+          <a:lstStyle/>
+          <a:p>
+            <a:pPr algn="ctr"/>
+            <a:r>
+              <a:rPr lang="en-US" dirty="0">
+                <a:latin typeface="Arial" panose="020B0604020202020204" pitchFamily="34" charset="0"/>
+                <a:cs typeface="Arial" panose="020B0604020202020204" pitchFamily="34" charset="0"/>
+              </a:rPr>
+              <a:t>Sampling day</a:t>
+            </a:r>
+          </a:p>
+        </p:txBody>
+      </p:sp>
+      <p:sp>
+        <p:nvSpPr>
+          <p:cNvPr id="10" name="next">
+            <a:extLst>
+              <a:ext uri="{FF2B5EF4-FFF2-40B4-BE49-F238E27FC236}">
+                <a16:creationId xmlns:a16="http://schemas.microsoft.com/office/drawing/2014/main" id="{44587AAD-3A09-4344-8231-66259D63CEF5}"/>
+              </a:ext>
+            </a:extLst>
+          </p:cNvPr>
+          <p:cNvSpPr txBox="1"/>
+          <p:nvPr userDrawn="1"/>
+        </p:nvSpPr>
+        <p:spPr>
+          <a:xfrm>
+            <a:off x="8213932" y="4155126"/>
+            <a:ext cx="461665" cy="2702874"/>
+          </a:xfrm>
+          <a:prstGeom prst="rect">
+            <a:avLst/>
+          </a:prstGeom>
+          <a:noFill/>
+        </p:spPr>
+        <p:txBody>
+          <a:bodyPr vert="vert270" wrap="square" rtlCol="0">
+            <a:spAutoFit/>
+          </a:bodyPr>
+          <a:lstStyle/>
+          <a:p>
+            <a:pPr algn="ctr"/>
+            <a:r>
+              <a:rPr lang="en-US" dirty="0">
+                <a:latin typeface="Arial" panose="020B0604020202020204" pitchFamily="34" charset="0"/>
+                <a:cs typeface="Arial" panose="020B0604020202020204" pitchFamily="34" charset="0"/>
+              </a:rPr>
+              <a:t>Following day</a:t>
+            </a:r>
+          </a:p>
+        </p:txBody>
+      </p:sp>
+      <p:sp>
+        <p:nvSpPr>
+          <p:cNvPr id="13" name="imgAnteAyer">
+            <a:extLst>
+              <a:ext uri="{FF2B5EF4-FFF2-40B4-BE49-F238E27FC236}">
+                <a16:creationId xmlns:a16="http://schemas.microsoft.com/office/drawing/2014/main" id="{A8B629B7-FEAE-1C41-96EC-7F08B052C080}"/>
+              </a:ext>
+            </a:extLst>
+          </p:cNvPr>
+          <p:cNvSpPr>
+            <a:spLocks noGrp="1"/>
+          </p:cNvSpPr>
+          <p:nvPr>
+            <p:ph sz="quarter" idx="19"/>
+          </p:nvPr>
+        </p:nvSpPr>
+        <p:spPr>
+          <a:xfrm>
+            <a:off x="4397272" y="1380960"/>
+            <a:ext cx="3397456" cy="2717965"/>
+          </a:xfrm>
+        </p:spPr>
+        <p:txBody>
+          <a:bodyPr/>
+          <a:lstStyle>
+            <a:lvl1pPr>
+              <a:defRPr>
+                <a:latin typeface="Arial" panose="020B0604020202020204" pitchFamily="34" charset="0"/>
+                <a:cs typeface="Arial" panose="020B0604020202020204" pitchFamily="34" charset="0"/>
+              </a:defRPr>
+            </a:lvl1pPr>
+            <a:lvl2pPr>
+              <a:defRPr>
+                <a:latin typeface="Arial" panose="020B0604020202020204" pitchFamily="34" charset="0"/>
+                <a:cs typeface="Arial" panose="020B0604020202020204" pitchFamily="34" charset="0"/>
+              </a:defRPr>
+            </a:lvl2pPr>
+            <a:lvl3pPr>
+              <a:defRPr>
+                <a:latin typeface="Arial" panose="020B0604020202020204" pitchFamily="34" charset="0"/>
+                <a:cs typeface="Arial" panose="020B0604020202020204" pitchFamily="34" charset="0"/>
+              </a:defRPr>
+            </a:lvl3pPr>
+            <a:lvl4pPr>
+              <a:defRPr>
+                <a:latin typeface="Arial" panose="020B0604020202020204" pitchFamily="34" charset="0"/>
+                <a:cs typeface="Arial" panose="020B0604020202020204" pitchFamily="34" charset="0"/>
+              </a:defRPr>
+            </a:lvl4pPr>
+            <a:lvl5pPr>
+              <a:defRPr>
+                <a:latin typeface="Arial" panose="020B0604020202020204" pitchFamily="34" charset="0"/>
+                <a:cs typeface="Arial" panose="020B0604020202020204" pitchFamily="34" charset="0"/>
+              </a:defRPr>
+            </a:lvl5pPr>
+          </a:lstStyle>
+          <a:p>
+            <a:pPr lvl="0"/>
+            <a:r>
+              <a:rPr lang="en-US" dirty="0"/>
+              <a:t>Click to edit Master text styles</a:t>
+            </a:r>
+          </a:p>
+          <a:p>
+            <a:pPr lvl="1"/>
+            <a:r>
+              <a:rPr lang="en-US" dirty="0"/>
+              <a:t>Second level</a:t>
+            </a:r>
+          </a:p>
+          <a:p>
+            <a:pPr lvl="2"/>
+            <a:r>
+              <a:rPr lang="en-US" dirty="0"/>
+              <a:t>Third level</a:t>
+            </a:r>
+          </a:p>
+          <a:p>
+            <a:pPr lvl="3"/>
+            <a:r>
+              <a:rPr lang="en-US" dirty="0"/>
+              <a:t>Fourth level</a:t>
+            </a:r>
+          </a:p>
+          <a:p>
+            <a:pPr lvl="4"/>
+            <a:r>
+              <a:rPr lang="en-US" dirty="0"/>
+              <a:t>Fifth level</a:t>
+            </a:r>
+          </a:p>
+        </p:txBody>
+      </p:sp>
+      <p:sp>
+        <p:nvSpPr>
+          <p:cNvPr id="14" name="imgAyer">
+            <a:extLst>
+              <a:ext uri="{FF2B5EF4-FFF2-40B4-BE49-F238E27FC236}">
+                <a16:creationId xmlns:a16="http://schemas.microsoft.com/office/drawing/2014/main" id="{5236435B-ACEE-E244-92F9-C0FF6CCEA205}"/>
+              </a:ext>
+            </a:extLst>
+          </p:cNvPr>
+          <p:cNvSpPr>
+            <a:spLocks noGrp="1"/>
+          </p:cNvSpPr>
+          <p:nvPr>
+            <p:ph sz="quarter" idx="20"/>
+          </p:nvPr>
+        </p:nvSpPr>
+        <p:spPr>
+          <a:xfrm>
+            <a:off x="4397272" y="4140035"/>
+            <a:ext cx="3397456" cy="2717965"/>
+          </a:xfrm>
+        </p:spPr>
+        <p:txBody>
+          <a:bodyPr/>
+          <a:lstStyle>
+            <a:lvl1pPr>
+              <a:defRPr>
+                <a:latin typeface="Arial" panose="020B0604020202020204" pitchFamily="34" charset="0"/>
+                <a:cs typeface="Arial" panose="020B0604020202020204" pitchFamily="34" charset="0"/>
+              </a:defRPr>
+            </a:lvl1pPr>
+            <a:lvl2pPr>
+              <a:defRPr>
+                <a:latin typeface="Arial" panose="020B0604020202020204" pitchFamily="34" charset="0"/>
+                <a:cs typeface="Arial" panose="020B0604020202020204" pitchFamily="34" charset="0"/>
+              </a:defRPr>
+            </a:lvl2pPr>
+            <a:lvl3pPr>
+              <a:defRPr>
+                <a:latin typeface="Arial" panose="020B0604020202020204" pitchFamily="34" charset="0"/>
+                <a:cs typeface="Arial" panose="020B0604020202020204" pitchFamily="34" charset="0"/>
+              </a:defRPr>
+            </a:lvl3pPr>
+            <a:lvl4pPr>
+              <a:defRPr>
+                <a:latin typeface="Arial" panose="020B0604020202020204" pitchFamily="34" charset="0"/>
+                <a:cs typeface="Arial" panose="020B0604020202020204" pitchFamily="34" charset="0"/>
+              </a:defRPr>
+            </a:lvl4pPr>
+            <a:lvl5pPr>
+              <a:defRPr>
+                <a:latin typeface="Arial" panose="020B0604020202020204" pitchFamily="34" charset="0"/>
+                <a:cs typeface="Arial" panose="020B0604020202020204" pitchFamily="34" charset="0"/>
+              </a:defRPr>
+            </a:lvl5pPr>
+          </a:lstStyle>
+          <a:p>
+            <a:pPr lvl="0"/>
+            <a:r>
+              <a:rPr lang="en-US" dirty="0"/>
+              <a:t>Click to edit Master text styles</a:t>
+            </a:r>
+          </a:p>
+          <a:p>
+            <a:pPr lvl="1"/>
+            <a:r>
+              <a:rPr lang="en-US" dirty="0"/>
+              <a:t>Second level</a:t>
+            </a:r>
+          </a:p>
+          <a:p>
+            <a:pPr lvl="2"/>
+            <a:r>
+              <a:rPr lang="en-US" dirty="0"/>
+              <a:t>Third level</a:t>
+            </a:r>
+          </a:p>
+          <a:p>
+            <a:pPr lvl="3"/>
+            <a:r>
+              <a:rPr lang="en-US" dirty="0"/>
+              <a:t>Fourth level</a:t>
+            </a:r>
+          </a:p>
+          <a:p>
+            <a:pPr lvl="4"/>
+            <a:r>
+              <a:rPr lang="en-US" dirty="0"/>
+              <a:t>Fifth level</a:t>
+            </a:r>
+          </a:p>
+        </p:txBody>
+      </p:sp>
+      <p:sp>
+        <p:nvSpPr>
+          <p:cNvPr id="6" name="imgAM">
+            <a:extLst>
+              <a:ext uri="{FF2B5EF4-FFF2-40B4-BE49-F238E27FC236}">
+                <a16:creationId xmlns:a16="http://schemas.microsoft.com/office/drawing/2014/main" id="{249A8A22-DEE3-414B-9655-7EFD81F259C6}"/>
+              </a:ext>
+            </a:extLst>
+          </p:cNvPr>
+          <p:cNvSpPr>
+            <a:spLocks noGrp="1"/>
+          </p:cNvSpPr>
+          <p:nvPr>
+            <p:ph sz="quarter" idx="15"/>
+          </p:nvPr>
+        </p:nvSpPr>
+        <p:spPr>
+          <a:xfrm>
+            <a:off x="8675597" y="1380960"/>
+            <a:ext cx="3397456" cy="2717965"/>
+          </a:xfrm>
+        </p:spPr>
+        <p:txBody>
+          <a:bodyPr/>
+          <a:lstStyle>
+            <a:lvl1pPr>
+              <a:defRPr>
+                <a:latin typeface="Arial" panose="020B0604020202020204" pitchFamily="34" charset="0"/>
+                <a:cs typeface="Arial" panose="020B0604020202020204" pitchFamily="34" charset="0"/>
+              </a:defRPr>
+            </a:lvl1pPr>
+            <a:lvl2pPr>
+              <a:defRPr>
+                <a:latin typeface="Arial" panose="020B0604020202020204" pitchFamily="34" charset="0"/>
+                <a:cs typeface="Arial" panose="020B0604020202020204" pitchFamily="34" charset="0"/>
+              </a:defRPr>
+            </a:lvl2pPr>
+            <a:lvl3pPr>
+              <a:defRPr>
+                <a:latin typeface="Arial" panose="020B0604020202020204" pitchFamily="34" charset="0"/>
+                <a:cs typeface="Arial" panose="020B0604020202020204" pitchFamily="34" charset="0"/>
+              </a:defRPr>
+            </a:lvl3pPr>
+            <a:lvl4pPr>
+              <a:defRPr>
+                <a:latin typeface="Arial" panose="020B0604020202020204" pitchFamily="34" charset="0"/>
+                <a:cs typeface="Arial" panose="020B0604020202020204" pitchFamily="34" charset="0"/>
+              </a:defRPr>
+            </a:lvl4pPr>
+            <a:lvl5pPr>
+              <a:defRPr>
+                <a:latin typeface="Arial" panose="020B0604020202020204" pitchFamily="34" charset="0"/>
+                <a:cs typeface="Arial" panose="020B0604020202020204" pitchFamily="34" charset="0"/>
+              </a:defRPr>
+            </a:lvl5pPr>
+          </a:lstStyle>
+          <a:p>
+            <a:pPr lvl="0"/>
+            <a:r>
+              <a:rPr lang="en-US" dirty="0"/>
+              <a:t>Click to edit Master text styles</a:t>
+            </a:r>
+          </a:p>
+          <a:p>
+            <a:pPr lvl="1"/>
+            <a:r>
+              <a:rPr lang="en-US" dirty="0"/>
+              <a:t>Second level</a:t>
+            </a:r>
+          </a:p>
+          <a:p>
+            <a:pPr lvl="2"/>
+            <a:r>
+              <a:rPr lang="en-US" dirty="0"/>
+              <a:t>Third level</a:t>
+            </a:r>
+          </a:p>
+          <a:p>
+            <a:pPr lvl="3"/>
+            <a:r>
+              <a:rPr lang="en-US" dirty="0"/>
+              <a:t>Fourth level</a:t>
+            </a:r>
+          </a:p>
+          <a:p>
+            <a:pPr lvl="4"/>
+            <a:r>
+              <a:rPr lang="en-US" dirty="0"/>
+              <a:t>Fifth level</a:t>
+            </a:r>
+          </a:p>
+        </p:txBody>
+      </p:sp>
+      <p:sp>
+        <p:nvSpPr>
+          <p:cNvPr id="11" name="mouseID">
+            <a:extLst>
+              <a:ext uri="{FF2B5EF4-FFF2-40B4-BE49-F238E27FC236}">
+                <a16:creationId xmlns:a16="http://schemas.microsoft.com/office/drawing/2014/main" id="{78F4A154-93DD-4E4B-BBFD-C6DF0987866D}"/>
+              </a:ext>
+            </a:extLst>
+          </p:cNvPr>
+          <p:cNvSpPr>
+            <a:spLocks noGrp="1"/>
+          </p:cNvSpPr>
+          <p:nvPr>
+            <p:ph type="title" hasCustomPrompt="1"/>
+          </p:nvPr>
+        </p:nvSpPr>
+        <p:spPr>
+          <a:xfrm>
+            <a:off x="123076" y="-804"/>
+            <a:ext cx="2431223" cy="1325563"/>
+          </a:xfrm>
+        </p:spPr>
+        <p:txBody>
+          <a:bodyPr>
+            <a:normAutofit/>
+          </a:bodyPr>
+          <a:lstStyle>
+            <a:lvl1pPr>
+              <a:defRPr sz="3200">
+                <a:latin typeface="Arial" panose="020B0604020202020204" pitchFamily="34" charset="0"/>
+                <a:cs typeface="Arial" panose="020B0604020202020204" pitchFamily="34" charset="0"/>
+              </a:defRPr>
+            </a:lvl1pPr>
+          </a:lstStyle>
+          <a:p>
+            <a:r>
+              <a:rPr lang="en-US" dirty="0"/>
+              <a:t>ID:</a:t>
+            </a:r>
+          </a:p>
+        </p:txBody>
+      </p:sp>
+      <p:sp>
+        <p:nvSpPr>
+          <p:cNvPr id="17" name="imgNext">
+            <a:extLst>
+              <a:ext uri="{FF2B5EF4-FFF2-40B4-BE49-F238E27FC236}">
+                <a16:creationId xmlns:a16="http://schemas.microsoft.com/office/drawing/2014/main" id="{1759042F-9AAB-4E8D-A383-7DBE63597405}"/>
+              </a:ext>
+            </a:extLst>
+          </p:cNvPr>
+          <p:cNvSpPr>
+            <a:spLocks noGrp="1"/>
+          </p:cNvSpPr>
+          <p:nvPr>
+            <p:ph sz="quarter" idx="23"/>
+          </p:nvPr>
+        </p:nvSpPr>
+        <p:spPr>
+          <a:xfrm>
+            <a:off x="8675597" y="4139936"/>
+            <a:ext cx="3397456" cy="2717965"/>
+          </a:xfrm>
+        </p:spPr>
+        <p:txBody>
+          <a:bodyPr/>
+          <a:lstStyle>
+            <a:lvl1pPr>
+              <a:defRPr>
+                <a:latin typeface="Arial" panose="020B0604020202020204" pitchFamily="34" charset="0"/>
+                <a:cs typeface="Arial" panose="020B0604020202020204" pitchFamily="34" charset="0"/>
+              </a:defRPr>
+            </a:lvl1pPr>
+            <a:lvl2pPr>
+              <a:defRPr>
+                <a:latin typeface="Arial" panose="020B0604020202020204" pitchFamily="34" charset="0"/>
+                <a:cs typeface="Arial" panose="020B0604020202020204" pitchFamily="34" charset="0"/>
+              </a:defRPr>
+            </a:lvl2pPr>
+            <a:lvl3pPr>
+              <a:defRPr>
+                <a:latin typeface="Arial" panose="020B0604020202020204" pitchFamily="34" charset="0"/>
+                <a:cs typeface="Arial" panose="020B0604020202020204" pitchFamily="34" charset="0"/>
+              </a:defRPr>
+            </a:lvl3pPr>
+            <a:lvl4pPr>
+              <a:defRPr>
+                <a:latin typeface="Arial" panose="020B0604020202020204" pitchFamily="34" charset="0"/>
+                <a:cs typeface="Arial" panose="020B0604020202020204" pitchFamily="34" charset="0"/>
+              </a:defRPr>
+            </a:lvl4pPr>
+            <a:lvl5pPr>
+              <a:defRPr>
+                <a:latin typeface="Arial" panose="020B0604020202020204" pitchFamily="34" charset="0"/>
+                <a:cs typeface="Arial" panose="020B0604020202020204" pitchFamily="34" charset="0"/>
+              </a:defRPr>
+            </a:lvl5pPr>
+          </a:lstStyle>
+          <a:p>
+            <a:pPr lvl="0"/>
+            <a:r>
+              <a:rPr lang="en-US" dirty="0"/>
+              <a:t>Click to edit Master text styles</a:t>
+            </a:r>
+          </a:p>
+          <a:p>
+            <a:pPr lvl="1"/>
+            <a:r>
+              <a:rPr lang="en-US" dirty="0"/>
+              <a:t>Second level</a:t>
+            </a:r>
+          </a:p>
+          <a:p>
+            <a:pPr lvl="2"/>
+            <a:r>
+              <a:rPr lang="en-US" dirty="0"/>
+              <a:t>Third level</a:t>
+            </a:r>
+          </a:p>
+          <a:p>
+            <a:pPr lvl="3"/>
+            <a:r>
+              <a:rPr lang="en-US" dirty="0"/>
+              <a:t>Fourth level</a:t>
+            </a:r>
+          </a:p>
+          <a:p>
+            <a:pPr lvl="4"/>
+            <a:r>
+              <a:rPr lang="en-US" dirty="0"/>
+              <a:t>Fifth level</a:t>
+            </a:r>
+          </a:p>
+        </p:txBody>
+      </p:sp>
+      <p:sp>
+        <p:nvSpPr>
+          <p:cNvPr id="18" name="notes">
+            <a:extLst>
+              <a:ext uri="{FF2B5EF4-FFF2-40B4-BE49-F238E27FC236}">
+                <a16:creationId xmlns:a16="http://schemas.microsoft.com/office/drawing/2014/main" id="{8AAF784F-4FD4-4A96-86A3-769FA33F8B87}"/>
+              </a:ext>
+            </a:extLst>
+          </p:cNvPr>
+          <p:cNvSpPr>
+            <a:spLocks noGrp="1"/>
+          </p:cNvSpPr>
+          <p:nvPr>
+            <p:ph sz="quarter" idx="25" hasCustomPrompt="1"/>
+          </p:nvPr>
+        </p:nvSpPr>
+        <p:spPr>
+          <a:xfrm>
+            <a:off x="2840279" y="1"/>
+            <a:ext cx="5549338" cy="1325562"/>
+          </a:xfrm>
+        </p:spPr>
+        <p:txBody>
+          <a:bodyPr anchor="ctr">
+            <a:normAutofit/>
+          </a:bodyPr>
+          <a:lstStyle>
+            <a:lvl1pPr marL="0" indent="0" algn="l" defTabSz="914400" rtl="0" eaLnBrk="1" latinLnBrk="0" hangingPunct="1">
+              <a:lnSpc>
+                <a:spcPct val="90000"/>
+              </a:lnSpc>
+              <a:spcBef>
+                <a:spcPct val="0"/>
+              </a:spcBef>
+              <a:buNone/>
+              <a:defRPr lang="en-US" sz="1600" kern="1200" dirty="0">
+                <a:solidFill>
+                  <a:schemeClr val="tx1"/>
+                </a:solidFill>
+                <a:latin typeface="Arial" panose="020B0604020202020204" pitchFamily="34" charset="0"/>
+                <a:ea typeface="+mj-ea"/>
+                <a:cs typeface="Arial" panose="020B0604020202020204" pitchFamily="34" charset="0"/>
+              </a:defRPr>
+            </a:lvl1pPr>
+          </a:lstStyle>
+          <a:p>
+            <a:pPr lvl="0"/>
+            <a:r>
+              <a:rPr lang="en-US" dirty="0"/>
+              <a:t>Notes</a:t>
+            </a:r>
+          </a:p>
+        </p:txBody>
+      </p:sp>
+    </p:spTree>
+    <p:extLst>
+      <p:ext uri="{BB962C8B-B14F-4D97-AF65-F5344CB8AC3E}">
+        <p14:creationId xmlns:p14="http://schemas.microsoft.com/office/powerpoint/2010/main" val="580302380"/>
+      </p:ext>
+    </p:extLst>
+  </p:cSld>
+  <p:clrMapOvr>
+    <a:masterClrMapping/>
+  </p:clrMapOvr>
+</p:sldLayout>
+</file>
+
+<file path=ppt/slideLayouts/slideLayout5.xml><?xml version="1.0" encoding="utf-8"?>
+<p:sldLayout xmlns:a="http://schemas.openxmlformats.org/drawingml/2006/main" xmlns:r="http://schemas.openxmlformats.org/officeDocument/2006/relationships" xmlns:p="http://schemas.openxmlformats.org/presentationml/2006/main" preserve="1" userDrawn="1">
+  <p:cSld name="samplingSlide4">
+    <p:spTree>
+      <p:nvGrpSpPr>
+        <p:cNvPr id="1" name=""/>
+        <p:cNvGrpSpPr/>
+        <p:nvPr/>
+      </p:nvGrpSpPr>
+      <p:grpSpPr>
+        <a:xfrm>
+          <a:off x="0" y="0"/>
+          <a:ext cx="0" cy="0"/>
+          <a:chOff x="0" y="0"/>
+          <a:chExt cx="0" cy="0"/>
+        </a:xfrm>
+      </p:grpSpPr>
+      <p:sp>
+        <p:nvSpPr>
+          <p:cNvPr id="16" name="maxLH">
+            <a:extLst>
+              <a:ext uri="{FF2B5EF4-FFF2-40B4-BE49-F238E27FC236}">
+                <a16:creationId xmlns:a16="http://schemas.microsoft.com/office/drawing/2014/main" id="{00A513FC-BAB5-4442-80A9-FB6B5801FFF9}"/>
+              </a:ext>
+            </a:extLst>
+          </p:cNvPr>
+          <p:cNvSpPr>
+            <a:spLocks noGrp="1"/>
+          </p:cNvSpPr>
+          <p:nvPr>
+            <p:ph sz="quarter" idx="22" hasCustomPrompt="1"/>
+          </p:nvPr>
+        </p:nvSpPr>
+        <p:spPr>
+          <a:xfrm>
+            <a:off x="8457200" y="0"/>
+            <a:ext cx="3734799" cy="1325562"/>
+          </a:xfrm>
+        </p:spPr>
+        <p:txBody>
+          <a:bodyPr anchor="ctr">
+            <a:normAutofit/>
+          </a:bodyPr>
+          <a:lstStyle>
+            <a:lvl1pPr marL="0" indent="0" algn="l" defTabSz="914400" rtl="0" eaLnBrk="1" latinLnBrk="0" hangingPunct="1">
+              <a:lnSpc>
+                <a:spcPct val="90000"/>
+              </a:lnSpc>
+              <a:spcBef>
+                <a:spcPct val="0"/>
+              </a:spcBef>
+              <a:buNone/>
+              <a:defRPr lang="en-US" sz="3200" kern="1200" dirty="0">
+                <a:solidFill>
+                  <a:schemeClr val="tx1"/>
+                </a:solidFill>
+                <a:latin typeface="Arial" panose="020B0604020202020204" pitchFamily="34" charset="0"/>
+                <a:ea typeface="+mj-ea"/>
+                <a:cs typeface="Arial" panose="020B0604020202020204" pitchFamily="34" charset="0"/>
+              </a:defRPr>
+            </a:lvl1pPr>
+          </a:lstStyle>
+          <a:p>
+            <a:pPr lvl="0"/>
+            <a:r>
+              <a:rPr lang="en-US" dirty="0"/>
+              <a:t>Max LH:</a:t>
+            </a:r>
+          </a:p>
+        </p:txBody>
+      </p:sp>
+      <p:sp>
+        <p:nvSpPr>
+          <p:cNvPr id="15" name="cyclePlot">
+            <a:extLst>
+              <a:ext uri="{FF2B5EF4-FFF2-40B4-BE49-F238E27FC236}">
+                <a16:creationId xmlns:a16="http://schemas.microsoft.com/office/drawing/2014/main" id="{C473C8D3-71AE-9341-BE9B-BFF30B1490AC}"/>
+              </a:ext>
+            </a:extLst>
+          </p:cNvPr>
+          <p:cNvSpPr>
+            <a:spLocks noGrp="1"/>
+          </p:cNvSpPr>
+          <p:nvPr>
+            <p:ph sz="quarter" idx="21" hasCustomPrompt="1"/>
+          </p:nvPr>
+        </p:nvSpPr>
+        <p:spPr>
+          <a:xfrm>
+            <a:off x="272396" y="4483184"/>
+            <a:ext cx="5823604" cy="2298060"/>
+          </a:xfrm>
+        </p:spPr>
+        <p:txBody>
+          <a:bodyPr/>
+          <a:lstStyle>
+            <a:lvl1pPr marL="0" indent="0">
+              <a:buNone/>
+              <a:defRPr/>
+            </a:lvl1pPr>
+          </a:lstStyle>
+          <a:p>
+            <a:pPr lvl="0"/>
+            <a:r>
+              <a:rPr lang="en-US" dirty="0"/>
+              <a:t>Cycle</a:t>
+            </a:r>
+          </a:p>
+        </p:txBody>
+      </p:sp>
+      <p:sp>
+        <p:nvSpPr>
+          <p:cNvPr id="7" name="2 days before">
+            <a:extLst>
+              <a:ext uri="{FF2B5EF4-FFF2-40B4-BE49-F238E27FC236}">
+                <a16:creationId xmlns:a16="http://schemas.microsoft.com/office/drawing/2014/main" id="{2C3790EE-D439-B948-A520-A3EC787BAACD}"/>
+              </a:ext>
+            </a:extLst>
+          </p:cNvPr>
+          <p:cNvSpPr txBox="1"/>
+          <p:nvPr userDrawn="1"/>
+        </p:nvSpPr>
+        <p:spPr>
+          <a:xfrm>
+            <a:off x="0" y="1495344"/>
+            <a:ext cx="276999" cy="2759074"/>
+          </a:xfrm>
+          <a:prstGeom prst="rect">
+            <a:avLst/>
+          </a:prstGeom>
+          <a:noFill/>
+        </p:spPr>
+        <p:txBody>
+          <a:bodyPr vert="vert270" wrap="square" lIns="0" tIns="0" rIns="0" bIns="0" rtlCol="0">
+            <a:spAutoFit/>
+          </a:bodyPr>
+          <a:lstStyle/>
+          <a:p>
+            <a:pPr algn="ctr"/>
+            <a:r>
+              <a:rPr lang="en-US" dirty="0">
+                <a:latin typeface="Arial" panose="020B0604020202020204" pitchFamily="34" charset="0"/>
+                <a:cs typeface="Arial" panose="020B0604020202020204" pitchFamily="34" charset="0"/>
+              </a:rPr>
+              <a:t>2 days before</a:t>
+            </a:r>
+          </a:p>
+        </p:txBody>
+      </p:sp>
+      <p:sp>
+        <p:nvSpPr>
+          <p:cNvPr id="8" name="previous day">
+            <a:extLst>
+              <a:ext uri="{FF2B5EF4-FFF2-40B4-BE49-F238E27FC236}">
+                <a16:creationId xmlns:a16="http://schemas.microsoft.com/office/drawing/2014/main" id="{627E77C6-4F38-C84D-8019-FAE3364DA784}"/>
+              </a:ext>
+            </a:extLst>
+          </p:cNvPr>
+          <p:cNvSpPr txBox="1"/>
+          <p:nvPr userDrawn="1"/>
+        </p:nvSpPr>
+        <p:spPr>
+          <a:xfrm>
+            <a:off x="4047497" y="1515898"/>
+            <a:ext cx="276999" cy="2717966"/>
+          </a:xfrm>
+          <a:prstGeom prst="rect">
+            <a:avLst/>
+          </a:prstGeom>
+          <a:noFill/>
+        </p:spPr>
+        <p:txBody>
+          <a:bodyPr vert="vert270" wrap="square" lIns="0" tIns="0" rIns="0" bIns="0" rtlCol="0">
+            <a:spAutoFit/>
+          </a:bodyPr>
+          <a:lstStyle/>
+          <a:p>
+            <a:pPr algn="ctr"/>
+            <a:r>
+              <a:rPr lang="en-US" dirty="0">
+                <a:latin typeface="Arial" panose="020B0604020202020204" pitchFamily="34" charset="0"/>
+                <a:cs typeface="Arial" panose="020B0604020202020204" pitchFamily="34" charset="0"/>
+              </a:rPr>
+              <a:t>Previous day</a:t>
+            </a:r>
+          </a:p>
+        </p:txBody>
+      </p:sp>
+      <p:sp>
+        <p:nvSpPr>
+          <p:cNvPr id="9" name="am">
+            <a:extLst>
+              <a:ext uri="{FF2B5EF4-FFF2-40B4-BE49-F238E27FC236}">
+                <a16:creationId xmlns:a16="http://schemas.microsoft.com/office/drawing/2014/main" id="{9F2F03F3-A825-A34C-8C77-8125408D5213}"/>
+              </a:ext>
+            </a:extLst>
+          </p:cNvPr>
+          <p:cNvSpPr txBox="1"/>
+          <p:nvPr userDrawn="1"/>
+        </p:nvSpPr>
+        <p:spPr>
+          <a:xfrm>
+            <a:off x="8139900" y="1515899"/>
+            <a:ext cx="276999" cy="2717965"/>
+          </a:xfrm>
+          <a:prstGeom prst="rect">
+            <a:avLst/>
+          </a:prstGeom>
+          <a:noFill/>
+        </p:spPr>
+        <p:txBody>
+          <a:bodyPr vert="vert270" wrap="square" lIns="0" tIns="0" rIns="0" bIns="0" rtlCol="0">
+            <a:spAutoFit/>
+          </a:bodyPr>
+          <a:lstStyle/>
+          <a:p>
+            <a:pPr algn="ctr"/>
+            <a:r>
+              <a:rPr lang="en-US" dirty="0">
+                <a:latin typeface="Arial" panose="020B0604020202020204" pitchFamily="34" charset="0"/>
+                <a:cs typeface="Arial" panose="020B0604020202020204" pitchFamily="34" charset="0"/>
+              </a:rPr>
+              <a:t>Sampling day</a:t>
+            </a:r>
+          </a:p>
+        </p:txBody>
+      </p:sp>
+      <p:sp>
+        <p:nvSpPr>
+          <p:cNvPr id="13" name="imgAnteAyer">
+            <a:extLst>
+              <a:ext uri="{FF2B5EF4-FFF2-40B4-BE49-F238E27FC236}">
+                <a16:creationId xmlns:a16="http://schemas.microsoft.com/office/drawing/2014/main" id="{A8B629B7-FEAE-1C41-96EC-7F08B052C080}"/>
+              </a:ext>
+            </a:extLst>
+          </p:cNvPr>
+          <p:cNvSpPr>
+            <a:spLocks noGrp="1"/>
+          </p:cNvSpPr>
+          <p:nvPr>
+            <p:ph sz="quarter" idx="19"/>
+          </p:nvPr>
+        </p:nvSpPr>
+        <p:spPr>
+          <a:xfrm>
+            <a:off x="272396" y="1380961"/>
+            <a:ext cx="3734799" cy="2987840"/>
+          </a:xfrm>
+        </p:spPr>
+        <p:txBody>
+          <a:bodyPr/>
+          <a:lstStyle>
+            <a:lvl1pPr>
+              <a:defRPr>
+                <a:latin typeface="Arial" panose="020B0604020202020204" pitchFamily="34" charset="0"/>
+                <a:cs typeface="Arial" panose="020B0604020202020204" pitchFamily="34" charset="0"/>
+              </a:defRPr>
+            </a:lvl1pPr>
+            <a:lvl2pPr>
+              <a:defRPr>
+                <a:latin typeface="Arial" panose="020B0604020202020204" pitchFamily="34" charset="0"/>
+                <a:cs typeface="Arial" panose="020B0604020202020204" pitchFamily="34" charset="0"/>
+              </a:defRPr>
+            </a:lvl2pPr>
+            <a:lvl3pPr>
+              <a:defRPr>
+                <a:latin typeface="Arial" panose="020B0604020202020204" pitchFamily="34" charset="0"/>
+                <a:cs typeface="Arial" panose="020B0604020202020204" pitchFamily="34" charset="0"/>
+              </a:defRPr>
+            </a:lvl3pPr>
+            <a:lvl4pPr>
+              <a:defRPr>
+                <a:latin typeface="Arial" panose="020B0604020202020204" pitchFamily="34" charset="0"/>
+                <a:cs typeface="Arial" panose="020B0604020202020204" pitchFamily="34" charset="0"/>
+              </a:defRPr>
+            </a:lvl4pPr>
+            <a:lvl5pPr>
+              <a:defRPr>
+                <a:latin typeface="Arial" panose="020B0604020202020204" pitchFamily="34" charset="0"/>
+                <a:cs typeface="Arial" panose="020B0604020202020204" pitchFamily="34" charset="0"/>
+              </a:defRPr>
+            </a:lvl5pPr>
+          </a:lstStyle>
+          <a:p>
+            <a:pPr lvl="0"/>
+            <a:r>
+              <a:rPr lang="en-US"/>
+              <a:t>Click to edit Master text styles</a:t>
+            </a:r>
+          </a:p>
+          <a:p>
+            <a:pPr lvl="1"/>
+            <a:r>
+              <a:rPr lang="en-US"/>
+              <a:t>Second level</a:t>
+            </a:r>
+          </a:p>
+          <a:p>
+            <a:pPr lvl="2"/>
+            <a:r>
+              <a:rPr lang="en-US"/>
+              <a:t>Third level</a:t>
+            </a:r>
+          </a:p>
+          <a:p>
+            <a:pPr lvl="3"/>
+            <a:r>
+              <a:rPr lang="en-US"/>
+              <a:t>Fourth level</a:t>
+            </a:r>
+          </a:p>
+          <a:p>
+            <a:pPr lvl="4"/>
+            <a:r>
+              <a:rPr lang="en-US"/>
+              <a:t>Fifth level</a:t>
+            </a:r>
+          </a:p>
+        </p:txBody>
+      </p:sp>
+      <p:sp>
+        <p:nvSpPr>
+          <p:cNvPr id="14" name="imgAyer">
+            <a:extLst>
+              <a:ext uri="{FF2B5EF4-FFF2-40B4-BE49-F238E27FC236}">
+                <a16:creationId xmlns:a16="http://schemas.microsoft.com/office/drawing/2014/main" id="{5236435B-ACEE-E244-92F9-C0FF6CCEA205}"/>
+              </a:ext>
+            </a:extLst>
+          </p:cNvPr>
+          <p:cNvSpPr>
+            <a:spLocks noGrp="1"/>
+          </p:cNvSpPr>
+          <p:nvPr>
+            <p:ph sz="quarter" idx="20"/>
+          </p:nvPr>
+        </p:nvSpPr>
+        <p:spPr>
+          <a:xfrm>
+            <a:off x="4364799" y="1380961"/>
+            <a:ext cx="3734799" cy="2987840"/>
+          </a:xfrm>
+        </p:spPr>
+        <p:txBody>
+          <a:bodyPr/>
+          <a:lstStyle>
+            <a:lvl1pPr>
+              <a:defRPr>
+                <a:latin typeface="Arial" panose="020B0604020202020204" pitchFamily="34" charset="0"/>
+                <a:cs typeface="Arial" panose="020B0604020202020204" pitchFamily="34" charset="0"/>
+              </a:defRPr>
+            </a:lvl1pPr>
+            <a:lvl2pPr>
+              <a:defRPr>
+                <a:latin typeface="Arial" panose="020B0604020202020204" pitchFamily="34" charset="0"/>
+                <a:cs typeface="Arial" panose="020B0604020202020204" pitchFamily="34" charset="0"/>
+              </a:defRPr>
+            </a:lvl2pPr>
+            <a:lvl3pPr>
+              <a:defRPr>
+                <a:latin typeface="Arial" panose="020B0604020202020204" pitchFamily="34" charset="0"/>
+                <a:cs typeface="Arial" panose="020B0604020202020204" pitchFamily="34" charset="0"/>
+              </a:defRPr>
+            </a:lvl3pPr>
+            <a:lvl4pPr>
+              <a:defRPr>
+                <a:latin typeface="Arial" panose="020B0604020202020204" pitchFamily="34" charset="0"/>
+                <a:cs typeface="Arial" panose="020B0604020202020204" pitchFamily="34" charset="0"/>
+              </a:defRPr>
+            </a:lvl4pPr>
+            <a:lvl5pPr>
+              <a:defRPr>
+                <a:latin typeface="Arial" panose="020B0604020202020204" pitchFamily="34" charset="0"/>
+                <a:cs typeface="Arial" panose="020B0604020202020204" pitchFamily="34" charset="0"/>
+              </a:defRPr>
+            </a:lvl5pPr>
+          </a:lstStyle>
+          <a:p>
+            <a:pPr lvl="0"/>
+            <a:r>
+              <a:rPr lang="en-US" dirty="0"/>
+              <a:t>Click to edit Master text styles</a:t>
+            </a:r>
+          </a:p>
+          <a:p>
+            <a:pPr lvl="1"/>
+            <a:r>
+              <a:rPr lang="en-US" dirty="0"/>
+              <a:t>Second level</a:t>
+            </a:r>
+          </a:p>
+          <a:p>
+            <a:pPr lvl="2"/>
+            <a:r>
+              <a:rPr lang="en-US" dirty="0"/>
+              <a:t>Third level</a:t>
+            </a:r>
+          </a:p>
+          <a:p>
+            <a:pPr lvl="3"/>
+            <a:r>
+              <a:rPr lang="en-US" dirty="0"/>
+              <a:t>Fourth level</a:t>
+            </a:r>
+          </a:p>
+          <a:p>
+            <a:pPr lvl="4"/>
+            <a:r>
+              <a:rPr lang="en-US" dirty="0"/>
+              <a:t>Fifth level</a:t>
+            </a:r>
+          </a:p>
+        </p:txBody>
+      </p:sp>
+      <p:sp>
+        <p:nvSpPr>
+          <p:cNvPr id="6" name="imgAM">
+            <a:extLst>
+              <a:ext uri="{FF2B5EF4-FFF2-40B4-BE49-F238E27FC236}">
+                <a16:creationId xmlns:a16="http://schemas.microsoft.com/office/drawing/2014/main" id="{249A8A22-DEE3-414B-9655-7EFD81F259C6}"/>
+              </a:ext>
+            </a:extLst>
+          </p:cNvPr>
+          <p:cNvSpPr>
+            <a:spLocks noGrp="1"/>
+          </p:cNvSpPr>
+          <p:nvPr>
+            <p:ph sz="quarter" idx="15"/>
+          </p:nvPr>
+        </p:nvSpPr>
+        <p:spPr>
+          <a:xfrm>
+            <a:off x="8457201" y="1380961"/>
+            <a:ext cx="3734799" cy="2987840"/>
+          </a:xfrm>
+        </p:spPr>
+        <p:txBody>
+          <a:bodyPr/>
+          <a:lstStyle>
+            <a:lvl1pPr>
+              <a:defRPr>
+                <a:latin typeface="Arial" panose="020B0604020202020204" pitchFamily="34" charset="0"/>
+                <a:cs typeface="Arial" panose="020B0604020202020204" pitchFamily="34" charset="0"/>
+              </a:defRPr>
+            </a:lvl1pPr>
+            <a:lvl2pPr>
+              <a:defRPr>
+                <a:latin typeface="Arial" panose="020B0604020202020204" pitchFamily="34" charset="0"/>
+                <a:cs typeface="Arial" panose="020B0604020202020204" pitchFamily="34" charset="0"/>
+              </a:defRPr>
+            </a:lvl2pPr>
+            <a:lvl3pPr>
+              <a:defRPr>
+                <a:latin typeface="Arial" panose="020B0604020202020204" pitchFamily="34" charset="0"/>
+                <a:cs typeface="Arial" panose="020B0604020202020204" pitchFamily="34" charset="0"/>
+              </a:defRPr>
+            </a:lvl3pPr>
+            <a:lvl4pPr>
+              <a:defRPr>
+                <a:latin typeface="Arial" panose="020B0604020202020204" pitchFamily="34" charset="0"/>
+                <a:cs typeface="Arial" panose="020B0604020202020204" pitchFamily="34" charset="0"/>
+              </a:defRPr>
+            </a:lvl4pPr>
+            <a:lvl5pPr>
+              <a:defRPr>
+                <a:latin typeface="Arial" panose="020B0604020202020204" pitchFamily="34" charset="0"/>
+                <a:cs typeface="Arial" panose="020B0604020202020204" pitchFamily="34" charset="0"/>
+              </a:defRPr>
+            </a:lvl5pPr>
+          </a:lstStyle>
+          <a:p>
+            <a:pPr lvl="0"/>
+            <a:r>
+              <a:rPr lang="en-US" dirty="0"/>
+              <a:t>Click to edit Master text styles</a:t>
+            </a:r>
+          </a:p>
+          <a:p>
+            <a:pPr lvl="1"/>
+            <a:r>
+              <a:rPr lang="en-US" dirty="0"/>
+              <a:t>Second level</a:t>
+            </a:r>
+          </a:p>
+          <a:p>
+            <a:pPr lvl="2"/>
+            <a:r>
+              <a:rPr lang="en-US" dirty="0"/>
+              <a:t>Third level</a:t>
+            </a:r>
+          </a:p>
+          <a:p>
+            <a:pPr lvl="3"/>
+            <a:r>
+              <a:rPr lang="en-US" dirty="0"/>
+              <a:t>Fourth level</a:t>
+            </a:r>
+          </a:p>
+          <a:p>
+            <a:pPr lvl="4"/>
+            <a:r>
+              <a:rPr lang="en-US" dirty="0"/>
+              <a:t>Fifth level</a:t>
+            </a:r>
+          </a:p>
+        </p:txBody>
+      </p:sp>
+      <p:sp>
+        <p:nvSpPr>
+          <p:cNvPr id="11" name="mouseID">
+            <a:extLst>
+              <a:ext uri="{FF2B5EF4-FFF2-40B4-BE49-F238E27FC236}">
+                <a16:creationId xmlns:a16="http://schemas.microsoft.com/office/drawing/2014/main" id="{78F4A154-93DD-4E4B-BBFD-C6DF0987866D}"/>
+              </a:ext>
+            </a:extLst>
+          </p:cNvPr>
+          <p:cNvSpPr>
+            <a:spLocks noGrp="1"/>
+          </p:cNvSpPr>
+          <p:nvPr>
+            <p:ph type="title" hasCustomPrompt="1"/>
+          </p:nvPr>
+        </p:nvSpPr>
+        <p:spPr>
+          <a:xfrm>
+            <a:off x="278892" y="0"/>
+            <a:ext cx="2493805" cy="1325563"/>
+          </a:xfrm>
+        </p:spPr>
+        <p:txBody>
+          <a:bodyPr>
+            <a:normAutofit/>
+          </a:bodyPr>
+          <a:lstStyle>
+            <a:lvl1pPr>
+              <a:defRPr sz="3200">
+                <a:latin typeface="Arial" panose="020B0604020202020204" pitchFamily="34" charset="0"/>
+                <a:cs typeface="Arial" panose="020B0604020202020204" pitchFamily="34" charset="0"/>
+              </a:defRPr>
+            </a:lvl1pPr>
+          </a:lstStyle>
+          <a:p>
+            <a:r>
+              <a:rPr lang="en-US" dirty="0"/>
+              <a:t>ID:</a:t>
+            </a:r>
+          </a:p>
+        </p:txBody>
+      </p:sp>
+      <p:sp>
+        <p:nvSpPr>
+          <p:cNvPr id="18" name="imgNext">
+            <a:extLst>
+              <a:ext uri="{FF2B5EF4-FFF2-40B4-BE49-F238E27FC236}">
+                <a16:creationId xmlns:a16="http://schemas.microsoft.com/office/drawing/2014/main" id="{15388B32-41EB-4CB0-90B1-AECBAFAF7383}"/>
+              </a:ext>
+            </a:extLst>
+          </p:cNvPr>
+          <p:cNvSpPr>
+            <a:spLocks noGrp="1"/>
+          </p:cNvSpPr>
+          <p:nvPr>
+            <p:ph sz="quarter" idx="24"/>
+          </p:nvPr>
+        </p:nvSpPr>
+        <p:spPr>
+          <a:xfrm>
+            <a:off x="8457202" y="4483183"/>
+            <a:ext cx="2869560" cy="2295649"/>
+          </a:xfrm>
+        </p:spPr>
+        <p:txBody>
+          <a:bodyPr/>
+          <a:lstStyle>
+            <a:lvl1pPr>
+              <a:defRPr>
+                <a:latin typeface="Arial" panose="020B0604020202020204" pitchFamily="34" charset="0"/>
+                <a:cs typeface="Arial" panose="020B0604020202020204" pitchFamily="34" charset="0"/>
+              </a:defRPr>
+            </a:lvl1pPr>
+            <a:lvl2pPr>
+              <a:defRPr>
+                <a:latin typeface="Arial" panose="020B0604020202020204" pitchFamily="34" charset="0"/>
+                <a:cs typeface="Arial" panose="020B0604020202020204" pitchFamily="34" charset="0"/>
+              </a:defRPr>
+            </a:lvl2pPr>
+            <a:lvl3pPr>
+              <a:defRPr>
+                <a:latin typeface="Arial" panose="020B0604020202020204" pitchFamily="34" charset="0"/>
+                <a:cs typeface="Arial" panose="020B0604020202020204" pitchFamily="34" charset="0"/>
+              </a:defRPr>
+            </a:lvl3pPr>
+            <a:lvl4pPr>
+              <a:defRPr>
+                <a:latin typeface="Arial" panose="020B0604020202020204" pitchFamily="34" charset="0"/>
+                <a:cs typeface="Arial" panose="020B0604020202020204" pitchFamily="34" charset="0"/>
+              </a:defRPr>
+            </a:lvl4pPr>
+            <a:lvl5pPr>
+              <a:defRPr>
+                <a:latin typeface="Arial" panose="020B0604020202020204" pitchFamily="34" charset="0"/>
+                <a:cs typeface="Arial" panose="020B0604020202020204" pitchFamily="34" charset="0"/>
+              </a:defRPr>
+            </a:lvl5pPr>
+          </a:lstStyle>
+          <a:p>
+            <a:pPr lvl="0"/>
+            <a:r>
+              <a:rPr lang="en-US" dirty="0"/>
+              <a:t>Click to edit Master text styles</a:t>
+            </a:r>
+          </a:p>
+          <a:p>
+            <a:pPr lvl="1"/>
+            <a:r>
+              <a:rPr lang="en-US" dirty="0"/>
+              <a:t>Second level</a:t>
+            </a:r>
+          </a:p>
+          <a:p>
+            <a:pPr lvl="2"/>
+            <a:r>
+              <a:rPr lang="en-US" dirty="0"/>
+              <a:t>Third level</a:t>
+            </a:r>
+          </a:p>
+          <a:p>
+            <a:pPr lvl="3"/>
+            <a:r>
+              <a:rPr lang="en-US" dirty="0"/>
+              <a:t>Fourth level</a:t>
+            </a:r>
+          </a:p>
+          <a:p>
+            <a:pPr lvl="4"/>
+            <a:r>
+              <a:rPr lang="en-US" dirty="0"/>
+              <a:t>Fifth level</a:t>
+            </a:r>
+          </a:p>
+        </p:txBody>
+      </p:sp>
+      <p:sp>
+        <p:nvSpPr>
+          <p:cNvPr id="19" name="nextDay">
+            <a:extLst>
+              <a:ext uri="{FF2B5EF4-FFF2-40B4-BE49-F238E27FC236}">
+                <a16:creationId xmlns:a16="http://schemas.microsoft.com/office/drawing/2014/main" id="{C650ED41-87DB-4D69-9C54-448DB1D96A6F}"/>
+              </a:ext>
+            </a:extLst>
+          </p:cNvPr>
+          <p:cNvSpPr txBox="1"/>
+          <p:nvPr userDrawn="1"/>
+        </p:nvSpPr>
+        <p:spPr>
+          <a:xfrm>
+            <a:off x="8139900" y="4480772"/>
+            <a:ext cx="276999" cy="2298060"/>
+          </a:xfrm>
+          <a:prstGeom prst="rect">
+            <a:avLst/>
+          </a:prstGeom>
+          <a:noFill/>
+        </p:spPr>
+        <p:txBody>
+          <a:bodyPr vert="vert270" wrap="square" lIns="0" tIns="0" rIns="0" bIns="0" rtlCol="0">
+            <a:spAutoFit/>
+          </a:bodyPr>
+          <a:lstStyle/>
+          <a:p>
+            <a:pPr algn="ctr"/>
+            <a:r>
+              <a:rPr lang="en-US" dirty="0">
+                <a:latin typeface="Arial" panose="020B0604020202020204" pitchFamily="34" charset="0"/>
+                <a:cs typeface="Arial" panose="020B0604020202020204" pitchFamily="34" charset="0"/>
+              </a:rPr>
+              <a:t>Next day</a:t>
+            </a:r>
+          </a:p>
+        </p:txBody>
+      </p:sp>
+      <p:sp>
+        <p:nvSpPr>
+          <p:cNvPr id="17" name="notes">
+            <a:extLst>
+              <a:ext uri="{FF2B5EF4-FFF2-40B4-BE49-F238E27FC236}">
+                <a16:creationId xmlns:a16="http://schemas.microsoft.com/office/drawing/2014/main" id="{1982F32F-220D-4CD3-9060-47B09EF2BEEB}"/>
+              </a:ext>
+            </a:extLst>
+          </p:cNvPr>
+          <p:cNvSpPr>
+            <a:spLocks noGrp="1"/>
+          </p:cNvSpPr>
+          <p:nvPr>
+            <p:ph sz="quarter" idx="25" hasCustomPrompt="1"/>
+          </p:nvPr>
+        </p:nvSpPr>
+        <p:spPr>
+          <a:xfrm>
+            <a:off x="2840279" y="1"/>
+            <a:ext cx="5549338" cy="1325562"/>
+          </a:xfrm>
+        </p:spPr>
+        <p:txBody>
+          <a:bodyPr anchor="ctr">
+            <a:normAutofit/>
+          </a:bodyPr>
+          <a:lstStyle>
+            <a:lvl1pPr marL="0" indent="0" algn="l" defTabSz="914400" rtl="0" eaLnBrk="1" latinLnBrk="0" hangingPunct="1">
+              <a:lnSpc>
+                <a:spcPct val="90000"/>
+              </a:lnSpc>
+              <a:spcBef>
+                <a:spcPct val="0"/>
+              </a:spcBef>
+              <a:buNone/>
+              <a:defRPr lang="en-US" sz="1600" kern="1200" dirty="0">
+                <a:solidFill>
+                  <a:schemeClr val="tx1"/>
+                </a:solidFill>
+                <a:latin typeface="Arial" panose="020B0604020202020204" pitchFamily="34" charset="0"/>
+                <a:ea typeface="+mj-ea"/>
+                <a:cs typeface="Arial" panose="020B0604020202020204" pitchFamily="34" charset="0"/>
+              </a:defRPr>
+            </a:lvl1pPr>
+          </a:lstStyle>
+          <a:p>
+            <a:pPr lvl="0"/>
+            <a:r>
+              <a:rPr lang="en-US" dirty="0"/>
+              <a:t>Notes</a:t>
+            </a:r>
+          </a:p>
+        </p:txBody>
+      </p:sp>
+    </p:spTree>
+    <p:extLst>
+      <p:ext uri="{BB962C8B-B14F-4D97-AF65-F5344CB8AC3E}">
+        <p14:creationId xmlns:p14="http://schemas.microsoft.com/office/powerpoint/2010/main" val="496289207"/>
+      </p:ext>
+    </p:extLst>
+  </p:cSld>
+  <p:clrMapOvr>
+    <a:masterClrMapping/>
+  </p:clrMapOvr>
+</p:sldLayout>
+</file>
+
+<file path=ppt/slideLayouts/slideLayout6.xml><?xml version="1.0" encoding="utf-8"?>
 <p:sldLayout xmlns:a="http://schemas.openxmlformats.org/drawingml/2006/main" xmlns:r="http://schemas.openxmlformats.org/officeDocument/2006/relationships" xmlns:p="http://schemas.openxmlformats.org/presentationml/2006/main" type="obj" preserve="1">
   <p:cSld name="Title and Content">
     <p:spTree>
@@ -2767,7 +4515,7 @@
           <a:p>
             <a:fld id="{98D87B00-D02C-3C43-8451-528C95176F95}" type="datetimeFigureOut">
               <a:rPr lang="en-US" smtClean="0"/>
-              <a:t>8/27/21</a:t>
+              <a:t>7/15/2022</a:t>
             </a:fld>
             <a:endParaRPr lang="en-US"/>
           </a:p>
@@ -2840,7 +4588,7 @@
 </p:sldLayout>
 </file>
 
-<file path=ppt/slideLayouts/slideLayout5.xml><?xml version="1.0" encoding="utf-8"?>
+<file path=ppt/slideLayouts/slideLayout7.xml><?xml version="1.0" encoding="utf-8"?>
 <p:sldLayout xmlns:a="http://schemas.openxmlformats.org/drawingml/2006/main" xmlns:r="http://schemas.openxmlformats.org/officeDocument/2006/relationships" xmlns:p="http://schemas.openxmlformats.org/presentationml/2006/main" type="secHead" preserve="1">
   <p:cSld name="Section Header">
     <p:spTree>
@@ -3042,7 +4790,7 @@
           <a:p>
             <a:fld id="{98D87B00-D02C-3C43-8451-528C95176F95}" type="datetimeFigureOut">
               <a:rPr lang="en-US" smtClean="0"/>
-              <a:t>8/27/21</a:t>
+              <a:t>7/15/2022</a:t>
             </a:fld>
             <a:endParaRPr lang="en-US"/>
           </a:p>
@@ -3115,7 +4863,7 @@
 </p:sldLayout>
 </file>
 
-<file path=ppt/slideLayouts/slideLayout6.xml><?xml version="1.0" encoding="utf-8"?>
+<file path=ppt/slideLayouts/slideLayout8.xml><?xml version="1.0" encoding="utf-8"?>
 <p:sldLayout xmlns:a="http://schemas.openxmlformats.org/drawingml/2006/main" xmlns:r="http://schemas.openxmlformats.org/officeDocument/2006/relationships" xmlns:p="http://schemas.openxmlformats.org/presentationml/2006/main" type="twoObj" preserve="1">
   <p:cSld name="Two Content">
     <p:spTree>
@@ -3307,7 +5055,7 @@
           <a:p>
             <a:fld id="{98D87B00-D02C-3C43-8451-528C95176F95}" type="datetimeFigureOut">
               <a:rPr lang="en-US" smtClean="0"/>
-              <a:t>8/27/21</a:t>
+              <a:t>7/15/2022</a:t>
             </a:fld>
             <a:endParaRPr lang="en-US"/>
           </a:p>
@@ -3380,7 +5128,7 @@
 </p:sldLayout>
 </file>
 
-<file path=ppt/slideLayouts/slideLayout7.xml><?xml version="1.0" encoding="utf-8"?>
+<file path=ppt/slideLayouts/slideLayout9.xml><?xml version="1.0" encoding="utf-8"?>
 <p:sldLayout xmlns:a="http://schemas.openxmlformats.org/drawingml/2006/main" xmlns:r="http://schemas.openxmlformats.org/officeDocument/2006/relationships" xmlns:p="http://schemas.openxmlformats.org/presentationml/2006/main" type="twoTxTwoObj" preserve="1">
   <p:cSld name="Comparison">
     <p:spTree>
@@ -3719,7 +5467,7 @@
           <a:p>
             <a:fld id="{98D87B00-D02C-3C43-8451-528C95176F95}" type="datetimeFigureOut">
               <a:rPr lang="en-US" smtClean="0"/>
-              <a:t>8/27/21</a:t>
+              <a:t>7/15/2022</a:t>
             </a:fld>
             <a:endParaRPr lang="en-US"/>
           </a:p>
@@ -3783,260 +5531,6 @@
     <p:extLst>
       <p:ext uri="{BB962C8B-B14F-4D97-AF65-F5344CB8AC3E}">
         <p14:creationId xmlns:p14="http://schemas.microsoft.com/office/powerpoint/2010/main" val="321463979"/>
-      </p:ext>
-    </p:extLst>
-  </p:cSld>
-  <p:clrMapOvr>
-    <a:masterClrMapping/>
-  </p:clrMapOvr>
-</p:sldLayout>
-</file>
-
-<file path=ppt/slideLayouts/slideLayout8.xml><?xml version="1.0" encoding="utf-8"?>
-<p:sldLayout xmlns:a="http://schemas.openxmlformats.org/drawingml/2006/main" xmlns:r="http://schemas.openxmlformats.org/officeDocument/2006/relationships" xmlns:p="http://schemas.openxmlformats.org/presentationml/2006/main" type="titleOnly" preserve="1">
-  <p:cSld name="Title Only">
-    <p:spTree>
-      <p:nvGrpSpPr>
-        <p:cNvPr id="1" name=""/>
-        <p:cNvGrpSpPr/>
-        <p:nvPr/>
-      </p:nvGrpSpPr>
-      <p:grpSpPr>
-        <a:xfrm>
-          <a:off x="0" y="0"/>
-          <a:ext cx="0" cy="0"/>
-          <a:chOff x="0" y="0"/>
-          <a:chExt cx="0" cy="0"/>
-        </a:xfrm>
-      </p:grpSpPr>
-      <p:sp>
-        <p:nvSpPr>
-          <p:cNvPr id="2" name="Title 1">
-            <a:extLst>
-              <a:ext uri="{FF2B5EF4-FFF2-40B4-BE49-F238E27FC236}">
-                <a16:creationId xmlns:a16="http://schemas.microsoft.com/office/drawing/2014/main" id="{22AF3F2E-26FE-7747-A107-220F84EA7EC2}"/>
-              </a:ext>
-            </a:extLst>
-          </p:cNvPr>
-          <p:cNvSpPr>
-            <a:spLocks noGrp="1"/>
-          </p:cNvSpPr>
-          <p:nvPr>
-            <p:ph type="title"/>
-          </p:nvPr>
-        </p:nvSpPr>
-        <p:spPr/>
-        <p:txBody>
-          <a:bodyPr/>
-          <a:lstStyle/>
-          <a:p>
-            <a:r>
-              <a:rPr lang="en-US"/>
-              <a:t>Click to edit Master title style</a:t>
-            </a:r>
-          </a:p>
-        </p:txBody>
-      </p:sp>
-      <p:sp>
-        <p:nvSpPr>
-          <p:cNvPr id="3" name="Date Placeholder 2">
-            <a:extLst>
-              <a:ext uri="{FF2B5EF4-FFF2-40B4-BE49-F238E27FC236}">
-                <a16:creationId xmlns:a16="http://schemas.microsoft.com/office/drawing/2014/main" id="{DB82431A-789A-E74B-900D-6214F8DC165A}"/>
-              </a:ext>
-            </a:extLst>
-          </p:cNvPr>
-          <p:cNvSpPr>
-            <a:spLocks noGrp="1"/>
-          </p:cNvSpPr>
-          <p:nvPr>
-            <p:ph type="dt" sz="half" idx="10"/>
-          </p:nvPr>
-        </p:nvSpPr>
-        <p:spPr/>
-        <p:txBody>
-          <a:bodyPr/>
-          <a:lstStyle/>
-          <a:p>
-            <a:fld id="{98D87B00-D02C-3C43-8451-528C95176F95}" type="datetimeFigureOut">
-              <a:rPr lang="en-US" smtClean="0"/>
-              <a:t>8/27/21</a:t>
-            </a:fld>
-            <a:endParaRPr lang="en-US"/>
-          </a:p>
-        </p:txBody>
-      </p:sp>
-      <p:sp>
-        <p:nvSpPr>
-          <p:cNvPr id="4" name="Footer Placeholder 3">
-            <a:extLst>
-              <a:ext uri="{FF2B5EF4-FFF2-40B4-BE49-F238E27FC236}">
-                <a16:creationId xmlns:a16="http://schemas.microsoft.com/office/drawing/2014/main" id="{9B425FFA-28EE-324C-89C2-C12068B22B8A}"/>
-              </a:ext>
-            </a:extLst>
-          </p:cNvPr>
-          <p:cNvSpPr>
-            <a:spLocks noGrp="1"/>
-          </p:cNvSpPr>
-          <p:nvPr>
-            <p:ph type="ftr" sz="quarter" idx="11"/>
-          </p:nvPr>
-        </p:nvSpPr>
-        <p:spPr/>
-        <p:txBody>
-          <a:bodyPr/>
-          <a:lstStyle/>
-          <a:p>
-            <a:endParaRPr lang="en-US"/>
-          </a:p>
-        </p:txBody>
-      </p:sp>
-      <p:sp>
-        <p:nvSpPr>
-          <p:cNvPr id="5" name="Slide Number Placeholder 4">
-            <a:extLst>
-              <a:ext uri="{FF2B5EF4-FFF2-40B4-BE49-F238E27FC236}">
-                <a16:creationId xmlns:a16="http://schemas.microsoft.com/office/drawing/2014/main" id="{3C169F66-3FB6-2245-9FBE-619C01FA1FDF}"/>
-              </a:ext>
-            </a:extLst>
-          </p:cNvPr>
-          <p:cNvSpPr>
-            <a:spLocks noGrp="1"/>
-          </p:cNvSpPr>
-          <p:nvPr>
-            <p:ph type="sldNum" sz="quarter" idx="12"/>
-          </p:nvPr>
-        </p:nvSpPr>
-        <p:spPr/>
-        <p:txBody>
-          <a:bodyPr/>
-          <a:lstStyle/>
-          <a:p>
-            <a:fld id="{BA44168E-86A5-E643-B889-0D08F43ABB6D}" type="slidenum">
-              <a:rPr lang="en-US" smtClean="0"/>
-              <a:t>‹#›</a:t>
-            </a:fld>
-            <a:endParaRPr lang="en-US"/>
-          </a:p>
-        </p:txBody>
-      </p:sp>
-    </p:spTree>
-    <p:extLst>
-      <p:ext uri="{BB962C8B-B14F-4D97-AF65-F5344CB8AC3E}">
-        <p14:creationId xmlns:p14="http://schemas.microsoft.com/office/powerpoint/2010/main" val="2233107899"/>
-      </p:ext>
-    </p:extLst>
-  </p:cSld>
-  <p:clrMapOvr>
-    <a:masterClrMapping/>
-  </p:clrMapOvr>
-</p:sldLayout>
-</file>
-
-<file path=ppt/slideLayouts/slideLayout9.xml><?xml version="1.0" encoding="utf-8"?>
-<p:sldLayout xmlns:a="http://schemas.openxmlformats.org/drawingml/2006/main" xmlns:r="http://schemas.openxmlformats.org/officeDocument/2006/relationships" xmlns:p="http://schemas.openxmlformats.org/presentationml/2006/main" type="blank" preserve="1">
-  <p:cSld name="Blank">
-    <p:spTree>
-      <p:nvGrpSpPr>
-        <p:cNvPr id="1" name=""/>
-        <p:cNvGrpSpPr/>
-        <p:nvPr/>
-      </p:nvGrpSpPr>
-      <p:grpSpPr>
-        <a:xfrm>
-          <a:off x="0" y="0"/>
-          <a:ext cx="0" cy="0"/>
-          <a:chOff x="0" y="0"/>
-          <a:chExt cx="0" cy="0"/>
-        </a:xfrm>
-      </p:grpSpPr>
-      <p:sp>
-        <p:nvSpPr>
-          <p:cNvPr id="2" name="Date Placeholder 1">
-            <a:extLst>
-              <a:ext uri="{FF2B5EF4-FFF2-40B4-BE49-F238E27FC236}">
-                <a16:creationId xmlns:a16="http://schemas.microsoft.com/office/drawing/2014/main" id="{7166858D-B49F-5640-9FB7-DFA79A0CF7F1}"/>
-              </a:ext>
-            </a:extLst>
-          </p:cNvPr>
-          <p:cNvSpPr>
-            <a:spLocks noGrp="1"/>
-          </p:cNvSpPr>
-          <p:nvPr>
-            <p:ph type="dt" sz="half" idx="10"/>
-          </p:nvPr>
-        </p:nvSpPr>
-        <p:spPr/>
-        <p:txBody>
-          <a:bodyPr/>
-          <a:lstStyle/>
-          <a:p>
-            <a:fld id="{98D87B00-D02C-3C43-8451-528C95176F95}" type="datetimeFigureOut">
-              <a:rPr lang="en-US" smtClean="0"/>
-              <a:t>8/27/21</a:t>
-            </a:fld>
-            <a:endParaRPr lang="en-US"/>
-          </a:p>
-        </p:txBody>
-      </p:sp>
-      <p:sp>
-        <p:nvSpPr>
-          <p:cNvPr id="3" name="Footer Placeholder 2">
-            <a:extLst>
-              <a:ext uri="{FF2B5EF4-FFF2-40B4-BE49-F238E27FC236}">
-                <a16:creationId xmlns:a16="http://schemas.microsoft.com/office/drawing/2014/main" id="{66091A7B-09EF-E148-BD78-6435254EB92B}"/>
-              </a:ext>
-            </a:extLst>
-          </p:cNvPr>
-          <p:cNvSpPr>
-            <a:spLocks noGrp="1"/>
-          </p:cNvSpPr>
-          <p:nvPr>
-            <p:ph type="ftr" sz="quarter" idx="11"/>
-          </p:nvPr>
-        </p:nvSpPr>
-        <p:spPr/>
-        <p:txBody>
-          <a:bodyPr/>
-          <a:lstStyle/>
-          <a:p>
-            <a:endParaRPr lang="en-US"/>
-          </a:p>
-        </p:txBody>
-      </p:sp>
-      <p:sp>
-        <p:nvSpPr>
-          <p:cNvPr id="4" name="Slide Number Placeholder 3">
-            <a:extLst>
-              <a:ext uri="{FF2B5EF4-FFF2-40B4-BE49-F238E27FC236}">
-                <a16:creationId xmlns:a16="http://schemas.microsoft.com/office/drawing/2014/main" id="{DC39D03D-D72A-2D49-9ABE-86873662A4AE}"/>
-              </a:ext>
-            </a:extLst>
-          </p:cNvPr>
-          <p:cNvSpPr>
-            <a:spLocks noGrp="1"/>
-          </p:cNvSpPr>
-          <p:nvPr>
-            <p:ph type="sldNum" sz="quarter" idx="12"/>
-          </p:nvPr>
-        </p:nvSpPr>
-        <p:spPr/>
-        <p:txBody>
-          <a:bodyPr/>
-          <a:lstStyle/>
-          <a:p>
-            <a:fld id="{BA44168E-86A5-E643-B889-0D08F43ABB6D}" type="slidenum">
-              <a:rPr lang="en-US" smtClean="0"/>
-              <a:t>‹#›</a:t>
-            </a:fld>
-            <a:endParaRPr lang="en-US"/>
-          </a:p>
-        </p:txBody>
-      </p:sp>
-    </p:spTree>
-    <p:extLst>
-      <p:ext uri="{BB962C8B-B14F-4D97-AF65-F5344CB8AC3E}">
-        <p14:creationId xmlns:p14="http://schemas.microsoft.com/office/powerpoint/2010/main" val="166696720"/>
       </p:ext>
     </p:extLst>
   </p:cSld>
@@ -4214,7 +5708,7 @@
           <a:p>
             <a:fld id="{98D87B00-D02C-3C43-8451-528C95176F95}" type="datetimeFigureOut">
               <a:rPr lang="en-US" smtClean="0"/>
-              <a:t>8/27/21</a:t>
+              <a:t>7/15/2022</a:t>
             </a:fld>
             <a:endParaRPr lang="en-US"/>
           </a:p>
@@ -4322,16 +5816,18 @@
     <p:sldLayoutId id="2147483649" r:id="rId1"/>
     <p:sldLayoutId id="2147483660" r:id="rId2"/>
     <p:sldLayoutId id="2147483661" r:id="rId3"/>
-    <p:sldLayoutId id="2147483650" r:id="rId4"/>
-    <p:sldLayoutId id="2147483651" r:id="rId5"/>
-    <p:sldLayoutId id="2147483652" r:id="rId6"/>
-    <p:sldLayoutId id="2147483653" r:id="rId7"/>
-    <p:sldLayoutId id="2147483654" r:id="rId8"/>
-    <p:sldLayoutId id="2147483655" r:id="rId9"/>
-    <p:sldLayoutId id="2147483656" r:id="rId10"/>
-    <p:sldLayoutId id="2147483657" r:id="rId11"/>
-    <p:sldLayoutId id="2147483658" r:id="rId12"/>
-    <p:sldLayoutId id="2147483659" r:id="rId13"/>
+    <p:sldLayoutId id="2147483662" r:id="rId4"/>
+    <p:sldLayoutId id="2147483663" r:id="rId5"/>
+    <p:sldLayoutId id="2147483650" r:id="rId6"/>
+    <p:sldLayoutId id="2147483651" r:id="rId7"/>
+    <p:sldLayoutId id="2147483652" r:id="rId8"/>
+    <p:sldLayoutId id="2147483653" r:id="rId9"/>
+    <p:sldLayoutId id="2147483654" r:id="rId10"/>
+    <p:sldLayoutId id="2147483655" r:id="rId11"/>
+    <p:sldLayoutId id="2147483656" r:id="rId12"/>
+    <p:sldLayoutId id="2147483657" r:id="rId13"/>
+    <p:sldLayoutId id="2147483658" r:id="rId14"/>
+    <p:sldLayoutId id="2147483659" r:id="rId15"/>
   </p:sldLayoutIdLst>
   <p:txStyles>
     <p:titleStyle>

</xml_diff>